<commit_message>
creo que esta todo, solo faltaria agregar el pdf del plan
</commit_message>
<xml_diff>
--- a/EDT.pptx
+++ b/EDT.pptx
@@ -149,6 +149,806 @@
 <file path=ppt/changesInfos/changesInfo1.xml><?xml version="1.0" encoding="utf-8"?>
 <pc:chgInfo xmlns:a="http://schemas.openxmlformats.org/drawingml/2006/main" xmlns:r="http://schemas.openxmlformats.org/officeDocument/2006/relationships" xmlns:ac="http://schemas.microsoft.com/office/drawing/2013/main/command" xmlns:pc="http://schemas.microsoft.com/office/powerpoint/2013/main/command">
   <pc:docChgLst>
+    <pc:chgData name="Sofi Fernández" userId="5dcd86d9bf03d87f" providerId="LiveId" clId="{0D968FC9-45FF-4A34-9D4F-223E4420D3F4}"/>
+    <pc:docChg chg="undo custSel modSld sldOrd">
+      <pc:chgData name="Sofi Fernández" userId="5dcd86d9bf03d87f" providerId="LiveId" clId="{0D968FC9-45FF-4A34-9D4F-223E4420D3F4}" dt="2023-11-10T12:56:08.665" v="835" actId="478"/>
+      <pc:docMkLst>
+        <pc:docMk/>
+      </pc:docMkLst>
+      <pc:sldChg chg="addSp delSp modSp mod ord">
+        <pc:chgData name="Sofi Fernández" userId="5dcd86d9bf03d87f" providerId="LiveId" clId="{0D968FC9-45FF-4A34-9D4F-223E4420D3F4}" dt="2023-11-10T12:56:08.665" v="835" actId="478"/>
+        <pc:sldMkLst>
+          <pc:docMk/>
+          <pc:sldMk cId="1144188503" sldId="296"/>
+        </pc:sldMkLst>
+        <pc:spChg chg="del">
+          <ac:chgData name="Sofi Fernández" userId="5dcd86d9bf03d87f" providerId="LiveId" clId="{0D968FC9-45FF-4A34-9D4F-223E4420D3F4}" dt="2023-11-09T18:31:31.787" v="293" actId="478"/>
+          <ac:spMkLst>
+            <pc:docMk/>
+            <pc:sldMk cId="1144188503" sldId="296"/>
+            <ac:spMk id="2" creationId="{87926A82-6166-466D-A3A3-E32A7AC2BFCA}"/>
+          </ac:spMkLst>
+        </pc:spChg>
+        <pc:spChg chg="del">
+          <ac:chgData name="Sofi Fernández" userId="5dcd86d9bf03d87f" providerId="LiveId" clId="{0D968FC9-45FF-4A34-9D4F-223E4420D3F4}" dt="2023-11-09T17:41:35.648" v="0" actId="478"/>
+          <ac:spMkLst>
+            <pc:docMk/>
+            <pc:sldMk cId="1144188503" sldId="296"/>
+            <ac:spMk id="3" creationId="{E3C639A2-8920-756D-0214-8FF54142B917}"/>
+          </ac:spMkLst>
+        </pc:spChg>
+        <pc:spChg chg="del">
+          <ac:chgData name="Sofi Fernández" userId="5dcd86d9bf03d87f" providerId="LiveId" clId="{0D968FC9-45FF-4A34-9D4F-223E4420D3F4}" dt="2023-11-09T17:41:36.976" v="1" actId="478"/>
+          <ac:spMkLst>
+            <pc:docMk/>
+            <pc:sldMk cId="1144188503" sldId="296"/>
+            <ac:spMk id="4" creationId="{74055C55-2E77-4139-8670-5F4B84119D2D}"/>
+          </ac:spMkLst>
+        </pc:spChg>
+        <pc:spChg chg="del">
+          <ac:chgData name="Sofi Fernández" userId="5dcd86d9bf03d87f" providerId="LiveId" clId="{0D968FC9-45FF-4A34-9D4F-223E4420D3F4}" dt="2023-11-09T18:31:27.351" v="291" actId="478"/>
+          <ac:spMkLst>
+            <pc:docMk/>
+            <pc:sldMk cId="1144188503" sldId="296"/>
+            <ac:spMk id="5" creationId="{66D9B4A0-411D-4E7F-AB9E-95DE069B5C77}"/>
+          </ac:spMkLst>
+        </pc:spChg>
+        <pc:spChg chg="mod">
+          <ac:chgData name="Sofi Fernández" userId="5dcd86d9bf03d87f" providerId="LiveId" clId="{0D968FC9-45FF-4A34-9D4F-223E4420D3F4}" dt="2023-11-10T12:48:32.550" v="716" actId="1036"/>
+          <ac:spMkLst>
+            <pc:docMk/>
+            <pc:sldMk cId="1144188503" sldId="296"/>
+            <ac:spMk id="8" creationId="{908667E9-63CD-CCB9-B7B3-1CCF2F04E43A}"/>
+          </ac:spMkLst>
+        </pc:spChg>
+        <pc:spChg chg="mod">
+          <ac:chgData name="Sofi Fernández" userId="5dcd86d9bf03d87f" providerId="LiveId" clId="{0D968FC9-45FF-4A34-9D4F-223E4420D3F4}" dt="2023-11-10T12:48:32.550" v="716" actId="1036"/>
+          <ac:spMkLst>
+            <pc:docMk/>
+            <pc:sldMk cId="1144188503" sldId="296"/>
+            <ac:spMk id="9" creationId="{FBEBDD9E-FB07-3927-7B60-8ABDD2A7ABC5}"/>
+          </ac:spMkLst>
+        </pc:spChg>
+        <pc:spChg chg="add mod">
+          <ac:chgData name="Sofi Fernández" userId="5dcd86d9bf03d87f" providerId="LiveId" clId="{0D968FC9-45FF-4A34-9D4F-223E4420D3F4}" dt="2023-11-10T12:49:36.632" v="751" actId="1038"/>
+          <ac:spMkLst>
+            <pc:docMk/>
+            <pc:sldMk cId="1144188503" sldId="296"/>
+            <ac:spMk id="11" creationId="{C319D7A2-CBE6-9B75-57DA-268AC9C904D9}"/>
+          </ac:spMkLst>
+        </pc:spChg>
+        <pc:spChg chg="mod">
+          <ac:chgData name="Sofi Fernández" userId="5dcd86d9bf03d87f" providerId="LiveId" clId="{0D968FC9-45FF-4A34-9D4F-223E4420D3F4}" dt="2023-11-10T12:47:28.002" v="704" actId="1036"/>
+          <ac:spMkLst>
+            <pc:docMk/>
+            <pc:sldMk cId="1144188503" sldId="296"/>
+            <ac:spMk id="15" creationId="{89F54F0C-1EC0-11EF-D128-BF5293ACBB34}"/>
+          </ac:spMkLst>
+        </pc:spChg>
+        <pc:spChg chg="mod">
+          <ac:chgData name="Sofi Fernández" userId="5dcd86d9bf03d87f" providerId="LiveId" clId="{0D968FC9-45FF-4A34-9D4F-223E4420D3F4}" dt="2023-11-10T12:47:28.002" v="704" actId="1036"/>
+          <ac:spMkLst>
+            <pc:docMk/>
+            <pc:sldMk cId="1144188503" sldId="296"/>
+            <ac:spMk id="16" creationId="{A4B7FB05-B82B-7B42-B978-9293DEF66438}"/>
+          </ac:spMkLst>
+        </pc:spChg>
+        <pc:spChg chg="mod ord">
+          <ac:chgData name="Sofi Fernández" userId="5dcd86d9bf03d87f" providerId="LiveId" clId="{0D968FC9-45FF-4A34-9D4F-223E4420D3F4}" dt="2023-11-10T12:47:28.002" v="704" actId="1036"/>
+          <ac:spMkLst>
+            <pc:docMk/>
+            <pc:sldMk cId="1144188503" sldId="296"/>
+            <ac:spMk id="17" creationId="{2964EC17-BEB6-ABA8-15B2-2FBF65F4B2E5}"/>
+          </ac:spMkLst>
+        </pc:spChg>
+        <pc:spChg chg="mod">
+          <ac:chgData name="Sofi Fernández" userId="5dcd86d9bf03d87f" providerId="LiveId" clId="{0D968FC9-45FF-4A34-9D4F-223E4420D3F4}" dt="2023-11-10T12:47:28.002" v="704" actId="1036"/>
+          <ac:spMkLst>
+            <pc:docMk/>
+            <pc:sldMk cId="1144188503" sldId="296"/>
+            <ac:spMk id="18" creationId="{912543CF-3BD4-40B0-BB18-006DCC4331CA}"/>
+          </ac:spMkLst>
+        </pc:spChg>
+        <pc:spChg chg="mod">
+          <ac:chgData name="Sofi Fernández" userId="5dcd86d9bf03d87f" providerId="LiveId" clId="{0D968FC9-45FF-4A34-9D4F-223E4420D3F4}" dt="2023-11-10T12:47:28.002" v="704" actId="1036"/>
+          <ac:spMkLst>
+            <pc:docMk/>
+            <pc:sldMk cId="1144188503" sldId="296"/>
+            <ac:spMk id="19" creationId="{47933AAD-8607-D17B-EE14-2B6909C2339A}"/>
+          </ac:spMkLst>
+        </pc:spChg>
+        <pc:spChg chg="add mod ord">
+          <ac:chgData name="Sofi Fernández" userId="5dcd86d9bf03d87f" providerId="LiveId" clId="{0D968FC9-45FF-4A34-9D4F-223E4420D3F4}" dt="2023-11-10T12:47:28.002" v="704" actId="1036"/>
+          <ac:spMkLst>
+            <pc:docMk/>
+            <pc:sldMk cId="1144188503" sldId="296"/>
+            <ac:spMk id="20" creationId="{EA8B7B4F-5512-DCDB-D34A-7DA9AD9833B7}"/>
+          </ac:spMkLst>
+        </pc:spChg>
+        <pc:spChg chg="add mod">
+          <ac:chgData name="Sofi Fernández" userId="5dcd86d9bf03d87f" providerId="LiveId" clId="{0D968FC9-45FF-4A34-9D4F-223E4420D3F4}" dt="2023-11-10T12:48:32.550" v="716" actId="1036"/>
+          <ac:spMkLst>
+            <pc:docMk/>
+            <pc:sldMk cId="1144188503" sldId="296"/>
+            <ac:spMk id="21" creationId="{62CD0829-A33B-AB7A-8085-5588882231E6}"/>
+          </ac:spMkLst>
+        </pc:spChg>
+        <pc:spChg chg="add del mod">
+          <ac:chgData name="Sofi Fernández" userId="5dcd86d9bf03d87f" providerId="LiveId" clId="{0D968FC9-45FF-4A34-9D4F-223E4420D3F4}" dt="2023-11-10T12:45:45.381" v="657" actId="478"/>
+          <ac:spMkLst>
+            <pc:docMk/>
+            <pc:sldMk cId="1144188503" sldId="296"/>
+            <ac:spMk id="24" creationId="{A5EEBF19-3B39-D083-FC97-89A03D11ABCB}"/>
+          </ac:spMkLst>
+        </pc:spChg>
+        <pc:spChg chg="add mod">
+          <ac:chgData name="Sofi Fernández" userId="5dcd86d9bf03d87f" providerId="LiveId" clId="{0D968FC9-45FF-4A34-9D4F-223E4420D3F4}" dt="2023-11-10T12:49:36.632" v="751" actId="1038"/>
+          <ac:spMkLst>
+            <pc:docMk/>
+            <pc:sldMk cId="1144188503" sldId="296"/>
+            <ac:spMk id="25" creationId="{D93F28AC-D204-EEB0-FF8E-160AFC53B257}"/>
+          </ac:spMkLst>
+        </pc:spChg>
+        <pc:spChg chg="add mod">
+          <ac:chgData name="Sofi Fernández" userId="5dcd86d9bf03d87f" providerId="LiveId" clId="{0D968FC9-45FF-4A34-9D4F-223E4420D3F4}" dt="2023-11-10T12:47:28.002" v="704" actId="1036"/>
+          <ac:spMkLst>
+            <pc:docMk/>
+            <pc:sldMk cId="1144188503" sldId="296"/>
+            <ac:spMk id="26" creationId="{FDA0F5C0-6EAE-BF83-B4CB-8403D97FF945}"/>
+          </ac:spMkLst>
+        </pc:spChg>
+        <pc:spChg chg="add del mod">
+          <ac:chgData name="Sofi Fernández" userId="5dcd86d9bf03d87f" providerId="LiveId" clId="{0D968FC9-45FF-4A34-9D4F-223E4420D3F4}" dt="2023-11-09T18:27:08.021" v="243" actId="478"/>
+          <ac:spMkLst>
+            <pc:docMk/>
+            <pc:sldMk cId="1144188503" sldId="296"/>
+            <ac:spMk id="27" creationId="{DFC530A0-1C45-D057-A08B-9FF3942B5CC8}"/>
+          </ac:spMkLst>
+        </pc:spChg>
+        <pc:spChg chg="add mod">
+          <ac:chgData name="Sofi Fernández" userId="5dcd86d9bf03d87f" providerId="LiveId" clId="{0D968FC9-45FF-4A34-9D4F-223E4420D3F4}" dt="2023-11-10T12:50:15.481" v="756" actId="108"/>
+          <ac:spMkLst>
+            <pc:docMk/>
+            <pc:sldMk cId="1144188503" sldId="296"/>
+            <ac:spMk id="28" creationId="{06D81CBD-FDF8-33A1-F2D6-9A6F8271A9A5}"/>
+          </ac:spMkLst>
+        </pc:spChg>
+        <pc:spChg chg="add mod">
+          <ac:chgData name="Sofi Fernández" userId="5dcd86d9bf03d87f" providerId="LiveId" clId="{0D968FC9-45FF-4A34-9D4F-223E4420D3F4}" dt="2023-11-10T12:47:28.002" v="704" actId="1036"/>
+          <ac:spMkLst>
+            <pc:docMk/>
+            <pc:sldMk cId="1144188503" sldId="296"/>
+            <ac:spMk id="29" creationId="{667A6FFB-2FCB-A615-30B0-AECDE6F04DEC}"/>
+          </ac:spMkLst>
+        </pc:spChg>
+        <pc:spChg chg="add mod">
+          <ac:chgData name="Sofi Fernández" userId="5dcd86d9bf03d87f" providerId="LiveId" clId="{0D968FC9-45FF-4A34-9D4F-223E4420D3F4}" dt="2023-11-10T12:47:28.002" v="704" actId="1036"/>
+          <ac:spMkLst>
+            <pc:docMk/>
+            <pc:sldMk cId="1144188503" sldId="296"/>
+            <ac:spMk id="30" creationId="{139BDC3B-A60D-A898-7C9F-23A3339D4E17}"/>
+          </ac:spMkLst>
+        </pc:spChg>
+        <pc:spChg chg="add mod ord">
+          <ac:chgData name="Sofi Fernández" userId="5dcd86d9bf03d87f" providerId="LiveId" clId="{0D968FC9-45FF-4A34-9D4F-223E4420D3F4}" dt="2023-11-10T12:50:10.832" v="755" actId="1582"/>
+          <ac:spMkLst>
+            <pc:docMk/>
+            <pc:sldMk cId="1144188503" sldId="296"/>
+            <ac:spMk id="31" creationId="{5F4ADECE-E8B2-4A99-F69B-57119A234FB7}"/>
+          </ac:spMkLst>
+        </pc:spChg>
+        <pc:spChg chg="add mod">
+          <ac:chgData name="Sofi Fernández" userId="5dcd86d9bf03d87f" providerId="LiveId" clId="{0D968FC9-45FF-4A34-9D4F-223E4420D3F4}" dt="2023-11-10T12:48:32.550" v="716" actId="1036"/>
+          <ac:spMkLst>
+            <pc:docMk/>
+            <pc:sldMk cId="1144188503" sldId="296"/>
+            <ac:spMk id="35" creationId="{7AE7F7A3-95BF-E025-5629-96DCCAA1B875}"/>
+          </ac:spMkLst>
+        </pc:spChg>
+        <pc:spChg chg="add mod">
+          <ac:chgData name="Sofi Fernández" userId="5dcd86d9bf03d87f" providerId="LiveId" clId="{0D968FC9-45FF-4A34-9D4F-223E4420D3F4}" dt="2023-11-10T12:48:32.550" v="716" actId="1036"/>
+          <ac:spMkLst>
+            <pc:docMk/>
+            <pc:sldMk cId="1144188503" sldId="296"/>
+            <ac:spMk id="36" creationId="{9D4BAB41-B445-7692-B325-B3FBA8314FBA}"/>
+          </ac:spMkLst>
+        </pc:spChg>
+        <pc:spChg chg="add mod">
+          <ac:chgData name="Sofi Fernández" userId="5dcd86d9bf03d87f" providerId="LiveId" clId="{0D968FC9-45FF-4A34-9D4F-223E4420D3F4}" dt="2023-11-10T12:48:32.550" v="716" actId="1036"/>
+          <ac:spMkLst>
+            <pc:docMk/>
+            <pc:sldMk cId="1144188503" sldId="296"/>
+            <ac:spMk id="37" creationId="{8A735F5F-1803-D0AC-8E4D-EAA9AA96037D}"/>
+          </ac:spMkLst>
+        </pc:spChg>
+        <pc:spChg chg="add mod">
+          <ac:chgData name="Sofi Fernández" userId="5dcd86d9bf03d87f" providerId="LiveId" clId="{0D968FC9-45FF-4A34-9D4F-223E4420D3F4}" dt="2023-11-10T12:50:17.771" v="757" actId="108"/>
+          <ac:spMkLst>
+            <pc:docMk/>
+            <pc:sldMk cId="1144188503" sldId="296"/>
+            <ac:spMk id="46" creationId="{F08F5298-F69C-C19D-27A7-416234861554}"/>
+          </ac:spMkLst>
+        </pc:spChg>
+        <pc:spChg chg="add del mod">
+          <ac:chgData name="Sofi Fernández" userId="5dcd86d9bf03d87f" providerId="LiveId" clId="{0D968FC9-45FF-4A34-9D4F-223E4420D3F4}" dt="2023-11-09T18:31:30.275" v="292" actId="478"/>
+          <ac:spMkLst>
+            <pc:docMk/>
+            <pc:sldMk cId="1144188503" sldId="296"/>
+            <ac:spMk id="48" creationId="{3D5F68A7-9ABC-2CAA-1B58-D3EF35C8EAE1}"/>
+          </ac:spMkLst>
+        </pc:spChg>
+        <pc:spChg chg="add del mod">
+          <ac:chgData name="Sofi Fernández" userId="5dcd86d9bf03d87f" providerId="LiveId" clId="{0D968FC9-45FF-4A34-9D4F-223E4420D3F4}" dt="2023-11-09T18:31:33.473" v="295" actId="478"/>
+          <ac:spMkLst>
+            <pc:docMk/>
+            <pc:sldMk cId="1144188503" sldId="296"/>
+            <ac:spMk id="50" creationId="{F00CBFB2-30C1-2B80-BA76-E771600383F5}"/>
+          </ac:spMkLst>
+        </pc:spChg>
+        <pc:spChg chg="add mod">
+          <ac:chgData name="Sofi Fernández" userId="5dcd86d9bf03d87f" providerId="LiveId" clId="{0D968FC9-45FF-4A34-9D4F-223E4420D3F4}" dt="2023-11-10T12:48:32.550" v="716" actId="1036"/>
+          <ac:spMkLst>
+            <pc:docMk/>
+            <pc:sldMk cId="1144188503" sldId="296"/>
+            <ac:spMk id="52" creationId="{65488DB7-261C-0203-D762-80DC70F572D5}"/>
+          </ac:spMkLst>
+        </pc:spChg>
+        <pc:spChg chg="add del mod ord">
+          <ac:chgData name="Sofi Fernández" userId="5dcd86d9bf03d87f" providerId="LiveId" clId="{0D968FC9-45FF-4A34-9D4F-223E4420D3F4}" dt="2023-11-10T12:56:08.665" v="835" actId="478"/>
+          <ac:spMkLst>
+            <pc:docMk/>
+            <pc:sldMk cId="1144188503" sldId="296"/>
+            <ac:spMk id="68" creationId="{A520B571-FA8A-8DC9-8472-28BD7CC06A5F}"/>
+          </ac:spMkLst>
+        </pc:spChg>
+        <pc:spChg chg="add mod">
+          <ac:chgData name="Sofi Fernández" userId="5dcd86d9bf03d87f" providerId="LiveId" clId="{0D968FC9-45FF-4A34-9D4F-223E4420D3F4}" dt="2023-11-10T12:56:00.018" v="834" actId="1076"/>
+          <ac:spMkLst>
+            <pc:docMk/>
+            <pc:sldMk cId="1144188503" sldId="296"/>
+            <ac:spMk id="69" creationId="{72CF3CCB-0103-D121-9086-2E6426F425F4}"/>
+          </ac:spMkLst>
+        </pc:spChg>
+        <pc:spChg chg="add mod">
+          <ac:chgData name="Sofi Fernández" userId="5dcd86d9bf03d87f" providerId="LiveId" clId="{0D968FC9-45FF-4A34-9D4F-223E4420D3F4}" dt="2023-11-10T12:56:00.018" v="834" actId="1076"/>
+          <ac:spMkLst>
+            <pc:docMk/>
+            <pc:sldMk cId="1144188503" sldId="296"/>
+            <ac:spMk id="70" creationId="{788299C7-C26D-60CB-9734-F6A8F3013476}"/>
+          </ac:spMkLst>
+        </pc:spChg>
+        <pc:spChg chg="mod">
+          <ac:chgData name="Sofi Fernández" userId="5dcd86d9bf03d87f" providerId="LiveId" clId="{0D968FC9-45FF-4A34-9D4F-223E4420D3F4}" dt="2023-11-10T12:48:00.355" v="706" actId="108"/>
+          <ac:spMkLst>
+            <pc:docMk/>
+            <pc:sldMk cId="1144188503" sldId="296"/>
+            <ac:spMk id="144" creationId="{F21E8B07-0BC6-4DE6-B1E4-773C5D1F75EB}"/>
+          </ac:spMkLst>
+        </pc:spChg>
+        <pc:spChg chg="mod">
+          <ac:chgData name="Sofi Fernández" userId="5dcd86d9bf03d87f" providerId="LiveId" clId="{0D968FC9-45FF-4A34-9D4F-223E4420D3F4}" dt="2023-11-10T12:48:10.278" v="707" actId="1076"/>
+          <ac:spMkLst>
+            <pc:docMk/>
+            <pc:sldMk cId="1144188503" sldId="296"/>
+            <ac:spMk id="147" creationId="{F3AE564E-E1AB-422A-9067-1D83448922D2}"/>
+          </ac:spMkLst>
+        </pc:spChg>
+        <pc:spChg chg="mod">
+          <ac:chgData name="Sofi Fernández" userId="5dcd86d9bf03d87f" providerId="LiveId" clId="{0D968FC9-45FF-4A34-9D4F-223E4420D3F4}" dt="2023-11-10T12:49:14.073" v="721" actId="1582"/>
+          <ac:spMkLst>
+            <pc:docMk/>
+            <pc:sldMk cId="1144188503" sldId="296"/>
+            <ac:spMk id="150" creationId="{A84C8281-0D5E-4BF0-AB85-487647294920}"/>
+          </ac:spMkLst>
+        </pc:spChg>
+        <pc:spChg chg="mod ord">
+          <ac:chgData name="Sofi Fernández" userId="5dcd86d9bf03d87f" providerId="LiveId" clId="{0D968FC9-45FF-4A34-9D4F-223E4420D3F4}" dt="2023-11-10T12:50:21.137" v="758" actId="108"/>
+          <ac:spMkLst>
+            <pc:docMk/>
+            <pc:sldMk cId="1144188503" sldId="296"/>
+            <ac:spMk id="153" creationId="{29118B4F-266C-48F0-8CAF-8BA67DF9A649}"/>
+          </ac:spMkLst>
+        </pc:spChg>
+        <pc:spChg chg="mod">
+          <ac:chgData name="Sofi Fernández" userId="5dcd86d9bf03d87f" providerId="LiveId" clId="{0D968FC9-45FF-4A34-9D4F-223E4420D3F4}" dt="2023-11-10T12:49:17.445" v="722" actId="108"/>
+          <ac:spMkLst>
+            <pc:docMk/>
+            <pc:sldMk cId="1144188503" sldId="296"/>
+            <ac:spMk id="156" creationId="{A2C318BC-6BF6-496E-9A8C-13F9CFE491B5}"/>
+          </ac:spMkLst>
+        </pc:spChg>
+        <pc:spChg chg="mod">
+          <ac:chgData name="Sofi Fernández" userId="5dcd86d9bf03d87f" providerId="LiveId" clId="{0D968FC9-45FF-4A34-9D4F-223E4420D3F4}" dt="2023-11-10T12:49:57.086" v="754" actId="1582"/>
+          <ac:spMkLst>
+            <pc:docMk/>
+            <pc:sldMk cId="1144188503" sldId="296"/>
+            <ac:spMk id="159" creationId="{8EED5A81-D106-422F-8455-CF5F456EB3E0}"/>
+          </ac:spMkLst>
+        </pc:spChg>
+        <pc:spChg chg="mod">
+          <ac:chgData name="Sofi Fernández" userId="5dcd86d9bf03d87f" providerId="LiveId" clId="{0D968FC9-45FF-4A34-9D4F-223E4420D3F4}" dt="2023-11-10T12:47:28.002" v="704" actId="1036"/>
+          <ac:spMkLst>
+            <pc:docMk/>
+            <pc:sldMk cId="1144188503" sldId="296"/>
+            <ac:spMk id="162" creationId="{BD569EE8-357F-4061-8190-6041007FBE4B}"/>
+          </ac:spMkLst>
+        </pc:spChg>
+        <pc:spChg chg="mod">
+          <ac:chgData name="Sofi Fernández" userId="5dcd86d9bf03d87f" providerId="LiveId" clId="{0D968FC9-45FF-4A34-9D4F-223E4420D3F4}" dt="2023-11-10T12:48:32.550" v="716" actId="1036"/>
+          <ac:spMkLst>
+            <pc:docMk/>
+            <pc:sldMk cId="1144188503" sldId="296"/>
+            <ac:spMk id="168" creationId="{6373F713-1680-4734-878B-86B182DC5AA6}"/>
+          </ac:spMkLst>
+        </pc:spChg>
+        <pc:spChg chg="del">
+          <ac:chgData name="Sofi Fernández" userId="5dcd86d9bf03d87f" providerId="LiveId" clId="{0D968FC9-45FF-4A34-9D4F-223E4420D3F4}" dt="2023-11-09T17:46:18.080" v="29" actId="478"/>
+          <ac:spMkLst>
+            <pc:docMk/>
+            <pc:sldMk cId="1144188503" sldId="296"/>
+            <ac:spMk id="171" creationId="{BEFA9A02-F4DD-44E9-86C2-C8ADA3189685}"/>
+          </ac:spMkLst>
+        </pc:spChg>
+        <pc:spChg chg="del">
+          <ac:chgData name="Sofi Fernández" userId="5dcd86d9bf03d87f" providerId="LiveId" clId="{0D968FC9-45FF-4A34-9D4F-223E4420D3F4}" dt="2023-11-09T17:46:21.481" v="30" actId="478"/>
+          <ac:spMkLst>
+            <pc:docMk/>
+            <pc:sldMk cId="1144188503" sldId="296"/>
+            <ac:spMk id="174" creationId="{EE16D351-7B7B-4FCF-8D90-11468672A1EC}"/>
+          </ac:spMkLst>
+        </pc:spChg>
+        <pc:spChg chg="del">
+          <ac:chgData name="Sofi Fernández" userId="5dcd86d9bf03d87f" providerId="LiveId" clId="{0D968FC9-45FF-4A34-9D4F-223E4420D3F4}" dt="2023-11-09T17:46:15.076" v="28" actId="478"/>
+          <ac:spMkLst>
+            <pc:docMk/>
+            <pc:sldMk cId="1144188503" sldId="296"/>
+            <ac:spMk id="177" creationId="{62FE95E2-7899-46D1-BD09-DBC69EBBF739}"/>
+          </ac:spMkLst>
+        </pc:spChg>
+        <pc:spChg chg="mod">
+          <ac:chgData name="Sofi Fernández" userId="5dcd86d9bf03d87f" providerId="LiveId" clId="{0D968FC9-45FF-4A34-9D4F-223E4420D3F4}" dt="2023-11-10T12:47:28.002" v="704" actId="1036"/>
+          <ac:spMkLst>
+            <pc:docMk/>
+            <pc:sldMk cId="1144188503" sldId="296"/>
+            <ac:spMk id="180" creationId="{C93299AE-BEEA-4E5E-88CB-50F2F112D78D}"/>
+          </ac:spMkLst>
+        </pc:spChg>
+        <pc:spChg chg="del">
+          <ac:chgData name="Sofi Fernández" userId="5dcd86d9bf03d87f" providerId="LiveId" clId="{0D968FC9-45FF-4A34-9D4F-223E4420D3F4}" dt="2023-11-09T17:46:03.035" v="25" actId="478"/>
+          <ac:spMkLst>
+            <pc:docMk/>
+            <pc:sldMk cId="1144188503" sldId="296"/>
+            <ac:spMk id="183" creationId="{DC38D3DB-30B8-4A79-9C76-C565CFF33780}"/>
+          </ac:spMkLst>
+        </pc:spChg>
+        <pc:spChg chg="mod">
+          <ac:chgData name="Sofi Fernández" userId="5dcd86d9bf03d87f" providerId="LiveId" clId="{0D968FC9-45FF-4A34-9D4F-223E4420D3F4}" dt="2023-11-10T12:47:28.002" v="704" actId="1036"/>
+          <ac:spMkLst>
+            <pc:docMk/>
+            <pc:sldMk cId="1144188503" sldId="296"/>
+            <ac:spMk id="186" creationId="{E00EF2F1-621C-44D5-923A-283EAD95A813}"/>
+          </ac:spMkLst>
+        </pc:spChg>
+        <pc:spChg chg="mod">
+          <ac:chgData name="Sofi Fernández" userId="5dcd86d9bf03d87f" providerId="LiveId" clId="{0D968FC9-45FF-4A34-9D4F-223E4420D3F4}" dt="2023-11-10T12:47:28.002" v="704" actId="1036"/>
+          <ac:spMkLst>
+            <pc:docMk/>
+            <pc:sldMk cId="1144188503" sldId="296"/>
+            <ac:spMk id="189" creationId="{AF7D30AD-3130-40C6-8BC9-7EE80B4B9A00}"/>
+          </ac:spMkLst>
+        </pc:spChg>
+        <pc:spChg chg="del">
+          <ac:chgData name="Sofi Fernández" userId="5dcd86d9bf03d87f" providerId="LiveId" clId="{0D968FC9-45FF-4A34-9D4F-223E4420D3F4}" dt="2023-11-09T17:46:05.761" v="26" actId="478"/>
+          <ac:spMkLst>
+            <pc:docMk/>
+            <pc:sldMk cId="1144188503" sldId="296"/>
+            <ac:spMk id="192" creationId="{7893426B-E83B-41DC-A793-6BBC6104B3A6}"/>
+          </ac:spMkLst>
+        </pc:spChg>
+        <pc:spChg chg="del">
+          <ac:chgData name="Sofi Fernández" userId="5dcd86d9bf03d87f" providerId="LiveId" clId="{0D968FC9-45FF-4A34-9D4F-223E4420D3F4}" dt="2023-11-09T17:46:10.911" v="27" actId="478"/>
+          <ac:spMkLst>
+            <pc:docMk/>
+            <pc:sldMk cId="1144188503" sldId="296"/>
+            <ac:spMk id="195" creationId="{81AC151D-872D-4D73-AE29-952F653257C0}"/>
+          </ac:spMkLst>
+        </pc:spChg>
+        <pc:spChg chg="del mod">
+          <ac:chgData name="Sofi Fernández" userId="5dcd86d9bf03d87f" providerId="LiveId" clId="{0D968FC9-45FF-4A34-9D4F-223E4420D3F4}" dt="2023-11-10T12:55:17.144" v="829" actId="478"/>
+          <ac:spMkLst>
+            <pc:docMk/>
+            <pc:sldMk cId="1144188503" sldId="296"/>
+            <ac:spMk id="210" creationId="{3D0CC422-902A-4D8F-AA6A-E9A681A2E9BF}"/>
+          </ac:spMkLst>
+        </pc:spChg>
+        <pc:spChg chg="del mod">
+          <ac:chgData name="Sofi Fernández" userId="5dcd86d9bf03d87f" providerId="LiveId" clId="{0D968FC9-45FF-4A34-9D4F-223E4420D3F4}" dt="2023-11-10T12:55:17.144" v="829" actId="478"/>
+          <ac:spMkLst>
+            <pc:docMk/>
+            <pc:sldMk cId="1144188503" sldId="296"/>
+            <ac:spMk id="212" creationId="{78525528-D696-4051-A168-1EEDC39E1520}"/>
+          </ac:spMkLst>
+        </pc:spChg>
+        <pc:spChg chg="mod">
+          <ac:chgData name="Sofi Fernández" userId="5dcd86d9bf03d87f" providerId="LiveId" clId="{0D968FC9-45FF-4A34-9D4F-223E4420D3F4}" dt="2023-11-10T12:56:00.018" v="834" actId="1076"/>
+          <ac:spMkLst>
+            <pc:docMk/>
+            <pc:sldMk cId="1144188503" sldId="296"/>
+            <ac:spMk id="214" creationId="{16704A75-B346-4E41-B0E5-B89322F3AE57}"/>
+          </ac:spMkLst>
+        </pc:spChg>
+        <pc:spChg chg="mod">
+          <ac:chgData name="Sofi Fernández" userId="5dcd86d9bf03d87f" providerId="LiveId" clId="{0D968FC9-45FF-4A34-9D4F-223E4420D3F4}" dt="2023-11-10T12:56:00.018" v="834" actId="1076"/>
+          <ac:spMkLst>
+            <pc:docMk/>
+            <pc:sldMk cId="1144188503" sldId="296"/>
+            <ac:spMk id="216" creationId="{1E2D3A68-A542-48BA-A217-B074F4C32E1F}"/>
+          </ac:spMkLst>
+        </pc:spChg>
+        <pc:spChg chg="mod">
+          <ac:chgData name="Sofi Fernández" userId="5dcd86d9bf03d87f" providerId="LiveId" clId="{0D968FC9-45FF-4A34-9D4F-223E4420D3F4}" dt="2023-11-10T12:56:00.018" v="834" actId="1076"/>
+          <ac:spMkLst>
+            <pc:docMk/>
+            <pc:sldMk cId="1144188503" sldId="296"/>
+            <ac:spMk id="218" creationId="{A50A05D4-FD98-47D3-A6F4-E18865EE4200}"/>
+          </ac:spMkLst>
+        </pc:spChg>
+        <pc:spChg chg="mod">
+          <ac:chgData name="Sofi Fernández" userId="5dcd86d9bf03d87f" providerId="LiveId" clId="{0D968FC9-45FF-4A34-9D4F-223E4420D3F4}" dt="2023-11-10T12:56:00.018" v="834" actId="1076"/>
+          <ac:spMkLst>
+            <pc:docMk/>
+            <pc:sldMk cId="1144188503" sldId="296"/>
+            <ac:spMk id="220" creationId="{F6A83501-0BBC-4414-A5AC-BA2E93F7106C}"/>
+          </ac:spMkLst>
+        </pc:spChg>
+        <pc:cxnChg chg="add mod">
+          <ac:chgData name="Sofi Fernández" userId="5dcd86d9bf03d87f" providerId="LiveId" clId="{0D968FC9-45FF-4A34-9D4F-223E4420D3F4}" dt="2023-11-10T12:47:28.002" v="704" actId="1036"/>
+          <ac:cxnSpMkLst>
+            <pc:docMk/>
+            <pc:sldMk cId="1144188503" sldId="296"/>
+            <ac:cxnSpMk id="3" creationId="{153D6B9D-AECA-FDC9-9F73-8481F6B84598}"/>
+          </ac:cxnSpMkLst>
+        </pc:cxnChg>
+        <pc:cxnChg chg="add mod">
+          <ac:chgData name="Sofi Fernández" userId="5dcd86d9bf03d87f" providerId="LiveId" clId="{0D968FC9-45FF-4A34-9D4F-223E4420D3F4}" dt="2023-11-10T12:47:28.002" v="704" actId="1036"/>
+          <ac:cxnSpMkLst>
+            <pc:docMk/>
+            <pc:sldMk cId="1144188503" sldId="296"/>
+            <ac:cxnSpMk id="4" creationId="{3D0457FE-E176-DF3E-58C2-26574510611D}"/>
+          </ac:cxnSpMkLst>
+        </pc:cxnChg>
+        <pc:cxnChg chg="add mod ord">
+          <ac:chgData name="Sofi Fernández" userId="5dcd86d9bf03d87f" providerId="LiveId" clId="{0D968FC9-45FF-4A34-9D4F-223E4420D3F4}" dt="2023-11-10T12:49:36.632" v="751" actId="1038"/>
+          <ac:cxnSpMkLst>
+            <pc:docMk/>
+            <pc:sldMk cId="1144188503" sldId="296"/>
+            <ac:cxnSpMk id="6" creationId="{1E9F909B-FEAE-4470-5D06-37F45B01947B}"/>
+          </ac:cxnSpMkLst>
+        </pc:cxnChg>
+        <pc:cxnChg chg="mod">
+          <ac:chgData name="Sofi Fernández" userId="5dcd86d9bf03d87f" providerId="LiveId" clId="{0D968FC9-45FF-4A34-9D4F-223E4420D3F4}" dt="2023-11-10T12:47:28.002" v="704" actId="1036"/>
+          <ac:cxnSpMkLst>
+            <pc:docMk/>
+            <pc:sldMk cId="1144188503" sldId="296"/>
+            <ac:cxnSpMk id="7" creationId="{1C54223A-2F2C-4434-A30B-92D8CEE93CF0}"/>
+          </ac:cxnSpMkLst>
+        </pc:cxnChg>
+        <pc:cxnChg chg="add del mod">
+          <ac:chgData name="Sofi Fernández" userId="5dcd86d9bf03d87f" providerId="LiveId" clId="{0D968FC9-45FF-4A34-9D4F-223E4420D3F4}" dt="2023-11-10T12:35:45.103" v="482"/>
+          <ac:cxnSpMkLst>
+            <pc:docMk/>
+            <pc:sldMk cId="1144188503" sldId="296"/>
+            <ac:cxnSpMk id="12" creationId="{8E2C2D45-BAD4-03A4-E3A0-EA37E5C9F20B}"/>
+          </ac:cxnSpMkLst>
+        </pc:cxnChg>
+        <pc:cxnChg chg="add del mod">
+          <ac:chgData name="Sofi Fernández" userId="5dcd86d9bf03d87f" providerId="LiveId" clId="{0D968FC9-45FF-4A34-9D4F-223E4420D3F4}" dt="2023-11-10T12:35:45.103" v="482"/>
+          <ac:cxnSpMkLst>
+            <pc:docMk/>
+            <pc:sldMk cId="1144188503" sldId="296"/>
+            <ac:cxnSpMk id="13" creationId="{DFA1D7DC-0FD2-38BC-89C7-D4899EB73924}"/>
+          </ac:cxnSpMkLst>
+        </pc:cxnChg>
+        <pc:cxnChg chg="add mod">
+          <ac:chgData name="Sofi Fernández" userId="5dcd86d9bf03d87f" providerId="LiveId" clId="{0D968FC9-45FF-4A34-9D4F-223E4420D3F4}" dt="2023-11-10T12:49:36.632" v="751" actId="1038"/>
+          <ac:cxnSpMkLst>
+            <pc:docMk/>
+            <pc:sldMk cId="1144188503" sldId="296"/>
+            <ac:cxnSpMk id="14" creationId="{DDA3F3B1-21EE-C324-46F5-6D35AACB13B1}"/>
+          </ac:cxnSpMkLst>
+        </pc:cxnChg>
+        <pc:cxnChg chg="add mod">
+          <ac:chgData name="Sofi Fernández" userId="5dcd86d9bf03d87f" providerId="LiveId" clId="{0D968FC9-45FF-4A34-9D4F-223E4420D3F4}" dt="2023-11-10T12:49:36.632" v="751" actId="1038"/>
+          <ac:cxnSpMkLst>
+            <pc:docMk/>
+            <pc:sldMk cId="1144188503" sldId="296"/>
+            <ac:cxnSpMk id="22" creationId="{73C3940F-2361-EC72-2C73-8BA7558D0004}"/>
+          </ac:cxnSpMkLst>
+        </pc:cxnChg>
+        <pc:cxnChg chg="add mod">
+          <ac:chgData name="Sofi Fernández" userId="5dcd86d9bf03d87f" providerId="LiveId" clId="{0D968FC9-45FF-4A34-9D4F-223E4420D3F4}" dt="2023-11-10T12:47:28.002" v="704" actId="1036"/>
+          <ac:cxnSpMkLst>
+            <pc:docMk/>
+            <pc:sldMk cId="1144188503" sldId="296"/>
+            <ac:cxnSpMk id="23" creationId="{E73F44B0-9E2C-B4F7-23D1-18BD4366A740}"/>
+          </ac:cxnSpMkLst>
+        </pc:cxnChg>
+        <pc:cxnChg chg="add mod">
+          <ac:chgData name="Sofi Fernández" userId="5dcd86d9bf03d87f" providerId="LiveId" clId="{0D968FC9-45FF-4A34-9D4F-223E4420D3F4}" dt="2023-11-10T12:49:36.632" v="751" actId="1038"/>
+          <ac:cxnSpMkLst>
+            <pc:docMk/>
+            <pc:sldMk cId="1144188503" sldId="296"/>
+            <ac:cxnSpMk id="27" creationId="{2F4EE79B-85BA-36C9-B13C-9B683F246C5B}"/>
+          </ac:cxnSpMkLst>
+        </pc:cxnChg>
+        <pc:cxnChg chg="add mod">
+          <ac:chgData name="Sofi Fernández" userId="5dcd86d9bf03d87f" providerId="LiveId" clId="{0D968FC9-45FF-4A34-9D4F-223E4420D3F4}" dt="2023-11-10T12:48:32.550" v="716" actId="1036"/>
+          <ac:cxnSpMkLst>
+            <pc:docMk/>
+            <pc:sldMk cId="1144188503" sldId="296"/>
+            <ac:cxnSpMk id="33" creationId="{36BA6F7E-8C1C-1A07-E081-E5205F99A5D2}"/>
+          </ac:cxnSpMkLst>
+        </pc:cxnChg>
+        <pc:cxnChg chg="add del mod">
+          <ac:chgData name="Sofi Fernández" userId="5dcd86d9bf03d87f" providerId="LiveId" clId="{0D968FC9-45FF-4A34-9D4F-223E4420D3F4}" dt="2023-11-10T12:44:00.006" v="597" actId="478"/>
+          <ac:cxnSpMkLst>
+            <pc:docMk/>
+            <pc:sldMk cId="1144188503" sldId="296"/>
+            <ac:cxnSpMk id="34" creationId="{296C1B27-9B9A-1C46-C727-E5CF349ACB94}"/>
+          </ac:cxnSpMkLst>
+        </pc:cxnChg>
+        <pc:cxnChg chg="add mod">
+          <ac:chgData name="Sofi Fernández" userId="5dcd86d9bf03d87f" providerId="LiveId" clId="{0D968FC9-45FF-4A34-9D4F-223E4420D3F4}" dt="2023-11-10T12:48:32.550" v="716" actId="1036"/>
+          <ac:cxnSpMkLst>
+            <pc:docMk/>
+            <pc:sldMk cId="1144188503" sldId="296"/>
+            <ac:cxnSpMk id="38" creationId="{AE0AF7B2-1287-C203-F874-AB82BFD4A12E}"/>
+          </ac:cxnSpMkLst>
+        </pc:cxnChg>
+        <pc:cxnChg chg="add mod">
+          <ac:chgData name="Sofi Fernández" userId="5dcd86d9bf03d87f" providerId="LiveId" clId="{0D968FC9-45FF-4A34-9D4F-223E4420D3F4}" dt="2023-11-10T12:48:32.550" v="716" actId="1036"/>
+          <ac:cxnSpMkLst>
+            <pc:docMk/>
+            <pc:sldMk cId="1144188503" sldId="296"/>
+            <ac:cxnSpMk id="39" creationId="{A342E80F-B813-ADD6-EA4B-0047E83D5216}"/>
+          </ac:cxnSpMkLst>
+        </pc:cxnChg>
+        <pc:cxnChg chg="add mod">
+          <ac:chgData name="Sofi Fernández" userId="5dcd86d9bf03d87f" providerId="LiveId" clId="{0D968FC9-45FF-4A34-9D4F-223E4420D3F4}" dt="2023-11-10T12:48:32.550" v="716" actId="1036"/>
+          <ac:cxnSpMkLst>
+            <pc:docMk/>
+            <pc:sldMk cId="1144188503" sldId="296"/>
+            <ac:cxnSpMk id="40" creationId="{C86D24CA-E429-42E3-73B4-86F245A5AF50}"/>
+          </ac:cxnSpMkLst>
+        </pc:cxnChg>
+        <pc:cxnChg chg="add del mod">
+          <ac:chgData name="Sofi Fernández" userId="5dcd86d9bf03d87f" providerId="LiveId" clId="{0D968FC9-45FF-4A34-9D4F-223E4420D3F4}" dt="2023-11-10T12:48:48.013" v="719" actId="478"/>
+          <ac:cxnSpMkLst>
+            <pc:docMk/>
+            <pc:sldMk cId="1144188503" sldId="296"/>
+            <ac:cxnSpMk id="42" creationId="{7E25FA5D-48DA-38E4-571F-A4EE4F7B7F78}"/>
+          </ac:cxnSpMkLst>
+        </pc:cxnChg>
+        <pc:cxnChg chg="add del mod ord">
+          <ac:chgData name="Sofi Fernández" userId="5dcd86d9bf03d87f" providerId="LiveId" clId="{0D968FC9-45FF-4A34-9D4F-223E4420D3F4}" dt="2023-11-10T12:44:03.685" v="598" actId="478"/>
+          <ac:cxnSpMkLst>
+            <pc:docMk/>
+            <pc:sldMk cId="1144188503" sldId="296"/>
+            <ac:cxnSpMk id="43" creationId="{2960AC5D-996A-10A7-DE15-FE13AAA6BB9D}"/>
+          </ac:cxnSpMkLst>
+        </pc:cxnChg>
+        <pc:cxnChg chg="add mod">
+          <ac:chgData name="Sofi Fernández" userId="5dcd86d9bf03d87f" providerId="LiveId" clId="{0D968FC9-45FF-4A34-9D4F-223E4420D3F4}" dt="2023-11-10T12:47:28.002" v="704" actId="1036"/>
+          <ac:cxnSpMkLst>
+            <pc:docMk/>
+            <pc:sldMk cId="1144188503" sldId="296"/>
+            <ac:cxnSpMk id="50" creationId="{AA6288F6-F9CA-399A-4EFB-5D47F0E96037}"/>
+          </ac:cxnSpMkLst>
+        </pc:cxnChg>
+        <pc:cxnChg chg="add mod">
+          <ac:chgData name="Sofi Fernández" userId="5dcd86d9bf03d87f" providerId="LiveId" clId="{0D968FC9-45FF-4A34-9D4F-223E4420D3F4}" dt="2023-11-10T12:47:28.002" v="704" actId="1036"/>
+          <ac:cxnSpMkLst>
+            <pc:docMk/>
+            <pc:sldMk cId="1144188503" sldId="296"/>
+            <ac:cxnSpMk id="51" creationId="{5D67FC1E-CBF2-E9A7-DEA1-6EEBC9F04F62}"/>
+          </ac:cxnSpMkLst>
+        </pc:cxnChg>
+        <pc:cxnChg chg="add mod">
+          <ac:chgData name="Sofi Fernández" userId="5dcd86d9bf03d87f" providerId="LiveId" clId="{0D968FC9-45FF-4A34-9D4F-223E4420D3F4}" dt="2023-11-10T12:48:32.550" v="716" actId="1036"/>
+          <ac:cxnSpMkLst>
+            <pc:docMk/>
+            <pc:sldMk cId="1144188503" sldId="296"/>
+            <ac:cxnSpMk id="53" creationId="{1318DDEA-94CB-92EE-01AC-873792D72112}"/>
+          </ac:cxnSpMkLst>
+        </pc:cxnChg>
+        <pc:cxnChg chg="add mod">
+          <ac:chgData name="Sofi Fernández" userId="5dcd86d9bf03d87f" providerId="LiveId" clId="{0D968FC9-45FF-4A34-9D4F-223E4420D3F4}" dt="2023-11-10T12:47:28.002" v="704" actId="1036"/>
+          <ac:cxnSpMkLst>
+            <pc:docMk/>
+            <pc:sldMk cId="1144188503" sldId="296"/>
+            <ac:cxnSpMk id="54" creationId="{3C21E375-4ECD-0D46-F913-07E5B916AD77}"/>
+          </ac:cxnSpMkLst>
+        </pc:cxnChg>
+        <pc:cxnChg chg="add mod">
+          <ac:chgData name="Sofi Fernández" userId="5dcd86d9bf03d87f" providerId="LiveId" clId="{0D968FC9-45FF-4A34-9D4F-223E4420D3F4}" dt="2023-11-10T12:47:28.002" v="704" actId="1036"/>
+          <ac:cxnSpMkLst>
+            <pc:docMk/>
+            <pc:sldMk cId="1144188503" sldId="296"/>
+            <ac:cxnSpMk id="55" creationId="{994B101A-D1B7-63CD-99F7-F14FBB59C89D}"/>
+          </ac:cxnSpMkLst>
+        </pc:cxnChg>
+        <pc:cxnChg chg="add mod">
+          <ac:chgData name="Sofi Fernández" userId="5dcd86d9bf03d87f" providerId="LiveId" clId="{0D968FC9-45FF-4A34-9D4F-223E4420D3F4}" dt="2023-11-10T12:47:28.002" v="704" actId="1036"/>
+          <ac:cxnSpMkLst>
+            <pc:docMk/>
+            <pc:sldMk cId="1144188503" sldId="296"/>
+            <ac:cxnSpMk id="56" creationId="{0B6561E8-6B08-77DA-E4EB-BC367E23EFA0}"/>
+          </ac:cxnSpMkLst>
+        </pc:cxnChg>
+        <pc:cxnChg chg="add mod">
+          <ac:chgData name="Sofi Fernández" userId="5dcd86d9bf03d87f" providerId="LiveId" clId="{0D968FC9-45FF-4A34-9D4F-223E4420D3F4}" dt="2023-11-10T12:47:28.002" v="704" actId="1036"/>
+          <ac:cxnSpMkLst>
+            <pc:docMk/>
+            <pc:sldMk cId="1144188503" sldId="296"/>
+            <ac:cxnSpMk id="57" creationId="{5B5E924C-B66B-08CF-6518-7A0048095A5C}"/>
+          </ac:cxnSpMkLst>
+        </pc:cxnChg>
+        <pc:cxnChg chg="add mod">
+          <ac:chgData name="Sofi Fernández" userId="5dcd86d9bf03d87f" providerId="LiveId" clId="{0D968FC9-45FF-4A34-9D4F-223E4420D3F4}" dt="2023-11-10T12:47:28.002" v="704" actId="1036"/>
+          <ac:cxnSpMkLst>
+            <pc:docMk/>
+            <pc:sldMk cId="1144188503" sldId="296"/>
+            <ac:cxnSpMk id="58" creationId="{2ACAA877-A400-6000-A400-42EC61923B70}"/>
+          </ac:cxnSpMkLst>
+        </pc:cxnChg>
+        <pc:cxnChg chg="add del mod">
+          <ac:chgData name="Sofi Fernández" userId="5dcd86d9bf03d87f" providerId="LiveId" clId="{0D968FC9-45FF-4A34-9D4F-223E4420D3F4}" dt="2023-11-10T12:45:06.936" v="656" actId="478"/>
+          <ac:cxnSpMkLst>
+            <pc:docMk/>
+            <pc:sldMk cId="1144188503" sldId="296"/>
+            <ac:cxnSpMk id="59" creationId="{E61D2E47-0758-C44C-E274-901AB5D4F0AD}"/>
+          </ac:cxnSpMkLst>
+        </pc:cxnChg>
+        <pc:cxnChg chg="add mod">
+          <ac:chgData name="Sofi Fernández" userId="5dcd86d9bf03d87f" providerId="LiveId" clId="{0D968FC9-45FF-4A34-9D4F-223E4420D3F4}" dt="2023-11-10T12:48:32.550" v="716" actId="1036"/>
+          <ac:cxnSpMkLst>
+            <pc:docMk/>
+            <pc:sldMk cId="1144188503" sldId="296"/>
+            <ac:cxnSpMk id="61" creationId="{3DF66044-AEAA-3908-0216-048827BA346F}"/>
+          </ac:cxnSpMkLst>
+        </pc:cxnChg>
+        <pc:cxnChg chg="add mod">
+          <ac:chgData name="Sofi Fernández" userId="5dcd86d9bf03d87f" providerId="LiveId" clId="{0D968FC9-45FF-4A34-9D4F-223E4420D3F4}" dt="2023-11-10T12:47:28.002" v="704" actId="1036"/>
+          <ac:cxnSpMkLst>
+            <pc:docMk/>
+            <pc:sldMk cId="1144188503" sldId="296"/>
+            <ac:cxnSpMk id="63" creationId="{989F5311-CC49-3923-E4F5-B7F55FAAC32F}"/>
+          </ac:cxnSpMkLst>
+        </pc:cxnChg>
+        <pc:cxnChg chg="add mod">
+          <ac:chgData name="Sofi Fernández" userId="5dcd86d9bf03d87f" providerId="LiveId" clId="{0D968FC9-45FF-4A34-9D4F-223E4420D3F4}" dt="2023-11-10T12:47:28.002" v="704" actId="1036"/>
+          <ac:cxnSpMkLst>
+            <pc:docMk/>
+            <pc:sldMk cId="1144188503" sldId="296"/>
+            <ac:cxnSpMk id="64" creationId="{92E6D978-D991-9FE7-2318-18A5B222A7D8}"/>
+          </ac:cxnSpMkLst>
+        </pc:cxnChg>
+        <pc:cxnChg chg="add mod">
+          <ac:chgData name="Sofi Fernández" userId="5dcd86d9bf03d87f" providerId="LiveId" clId="{0D968FC9-45FF-4A34-9D4F-223E4420D3F4}" dt="2023-11-10T12:47:28.002" v="704" actId="1036"/>
+          <ac:cxnSpMkLst>
+            <pc:docMk/>
+            <pc:sldMk cId="1144188503" sldId="296"/>
+            <ac:cxnSpMk id="65" creationId="{73A6BD49-B0E0-18FD-6CAB-6D10977769ED}"/>
+          </ac:cxnSpMkLst>
+        </pc:cxnChg>
+        <pc:cxnChg chg="add mod">
+          <ac:chgData name="Sofi Fernández" userId="5dcd86d9bf03d87f" providerId="LiveId" clId="{0D968FC9-45FF-4A34-9D4F-223E4420D3F4}" dt="2023-11-10T12:47:28.002" v="704" actId="1036"/>
+          <ac:cxnSpMkLst>
+            <pc:docMk/>
+            <pc:sldMk cId="1144188503" sldId="296"/>
+            <ac:cxnSpMk id="66" creationId="{0016F92F-072E-9256-3D1D-AF285E6C294B}"/>
+          </ac:cxnSpMkLst>
+        </pc:cxnChg>
+        <pc:cxnChg chg="mod">
+          <ac:chgData name="Sofi Fernández" userId="5dcd86d9bf03d87f" providerId="LiveId" clId="{0D968FC9-45FF-4A34-9D4F-223E4420D3F4}" dt="2023-11-10T12:47:28.002" v="704" actId="1036"/>
+          <ac:cxnSpMkLst>
+            <pc:docMk/>
+            <pc:sldMk cId="1144188503" sldId="296"/>
+            <ac:cxnSpMk id="83" creationId="{6B7B494C-8888-457E-82D1-32EE6B401023}"/>
+          </ac:cxnSpMkLst>
+        </pc:cxnChg>
+        <pc:cxnChg chg="mod">
+          <ac:chgData name="Sofi Fernández" userId="5dcd86d9bf03d87f" providerId="LiveId" clId="{0D968FC9-45FF-4A34-9D4F-223E4420D3F4}" dt="2023-11-10T12:47:28.002" v="704" actId="1036"/>
+          <ac:cxnSpMkLst>
+            <pc:docMk/>
+            <pc:sldMk cId="1144188503" sldId="296"/>
+            <ac:cxnSpMk id="84" creationId="{215A627E-A616-4B35-A822-BCD857D053E8}"/>
+          </ac:cxnSpMkLst>
+        </pc:cxnChg>
+        <pc:cxnChg chg="mod">
+          <ac:chgData name="Sofi Fernández" userId="5dcd86d9bf03d87f" providerId="LiveId" clId="{0D968FC9-45FF-4A34-9D4F-223E4420D3F4}" dt="2023-11-10T12:48:42.339" v="717" actId="14100"/>
+          <ac:cxnSpMkLst>
+            <pc:docMk/>
+            <pc:sldMk cId="1144188503" sldId="296"/>
+            <ac:cxnSpMk id="85" creationId="{338A3F58-952C-4C6C-BE73-668B41F8708D}"/>
+          </ac:cxnSpMkLst>
+        </pc:cxnChg>
+        <pc:cxnChg chg="mod">
+          <ac:chgData name="Sofi Fernández" userId="5dcd86d9bf03d87f" providerId="LiveId" clId="{0D968FC9-45FF-4A34-9D4F-223E4420D3F4}" dt="2023-11-10T12:47:28.002" v="704" actId="1036"/>
+          <ac:cxnSpMkLst>
+            <pc:docMk/>
+            <pc:sldMk cId="1144188503" sldId="296"/>
+            <ac:cxnSpMk id="86" creationId="{499176F8-BEEF-4A37-97C9-A7E8592211E9}"/>
+          </ac:cxnSpMkLst>
+        </pc:cxnChg>
+        <pc:cxnChg chg="del mod">
+          <ac:chgData name="Sofi Fernández" userId="5dcd86d9bf03d87f" providerId="LiveId" clId="{0D968FC9-45FF-4A34-9D4F-223E4420D3F4}" dt="2023-11-10T12:44:06.958" v="599" actId="478"/>
+          <ac:cxnSpMkLst>
+            <pc:docMk/>
+            <pc:sldMk cId="1144188503" sldId="296"/>
+            <ac:cxnSpMk id="87" creationId="{E0A5E395-38A3-4ED8-A1C1-7892BF5B1BE1}"/>
+          </ac:cxnSpMkLst>
+        </pc:cxnChg>
+        <pc:cxnChg chg="mod">
+          <ac:chgData name="Sofi Fernández" userId="5dcd86d9bf03d87f" providerId="LiveId" clId="{0D968FC9-45FF-4A34-9D4F-223E4420D3F4}" dt="2023-11-10T12:47:28.002" v="704" actId="1036"/>
+          <ac:cxnSpMkLst>
+            <pc:docMk/>
+            <pc:sldMk cId="1144188503" sldId="296"/>
+            <ac:cxnSpMk id="96" creationId="{185DC171-E6CD-4880-8EF4-7E0DB7F6C2B2}"/>
+          </ac:cxnSpMkLst>
+        </pc:cxnChg>
+        <pc:cxnChg chg="mod">
+          <ac:chgData name="Sofi Fernández" userId="5dcd86d9bf03d87f" providerId="LiveId" clId="{0D968FC9-45FF-4A34-9D4F-223E4420D3F4}" dt="2023-11-10T12:47:28.002" v="704" actId="1036"/>
+          <ac:cxnSpMkLst>
+            <pc:docMk/>
+            <pc:sldMk cId="1144188503" sldId="296"/>
+            <ac:cxnSpMk id="97" creationId="{B5956150-D730-4D39-8E56-5123DA7B1791}"/>
+          </ac:cxnSpMkLst>
+        </pc:cxnChg>
+        <pc:cxnChg chg="mod">
+          <ac:chgData name="Sofi Fernández" userId="5dcd86d9bf03d87f" providerId="LiveId" clId="{0D968FC9-45FF-4A34-9D4F-223E4420D3F4}" dt="2023-11-10T12:47:28.002" v="704" actId="1036"/>
+          <ac:cxnSpMkLst>
+            <pc:docMk/>
+            <pc:sldMk cId="1144188503" sldId="296"/>
+            <ac:cxnSpMk id="98" creationId="{98000C8A-C564-4106-9005-252681A7FDFB}"/>
+          </ac:cxnSpMkLst>
+        </pc:cxnChg>
+        <pc:cxnChg chg="add del mod">
+          <ac:chgData name="Sofi Fernández" userId="5dcd86d9bf03d87f" providerId="LiveId" clId="{0D968FC9-45FF-4A34-9D4F-223E4420D3F4}" dt="2023-11-10T12:47:28.002" v="704" actId="1036"/>
+          <ac:cxnSpMkLst>
+            <pc:docMk/>
+            <pc:sldMk cId="1144188503" sldId="296"/>
+            <ac:cxnSpMk id="99" creationId="{DFAFA2FD-B58C-4CB3-83BF-D7037A44C5EA}"/>
+          </ac:cxnSpMkLst>
+        </pc:cxnChg>
+        <pc:cxnChg chg="del mod">
+          <ac:chgData name="Sofi Fernández" userId="5dcd86d9bf03d87f" providerId="LiveId" clId="{0D968FC9-45FF-4A34-9D4F-223E4420D3F4}" dt="2023-11-09T18:42:10.800" v="416" actId="478"/>
+          <ac:cxnSpMkLst>
+            <pc:docMk/>
+            <pc:sldMk cId="1144188503" sldId="296"/>
+            <ac:cxnSpMk id="100" creationId="{92CA40FF-E75F-4233-A382-4E9DE1FACF8D}"/>
+          </ac:cxnSpMkLst>
+        </pc:cxnChg>
+        <pc:cxnChg chg="mod">
+          <ac:chgData name="Sofi Fernández" userId="5dcd86d9bf03d87f" providerId="LiveId" clId="{0D968FC9-45FF-4A34-9D4F-223E4420D3F4}" dt="2023-11-10T12:47:28.002" v="704" actId="1036"/>
+          <ac:cxnSpMkLst>
+            <pc:docMk/>
+            <pc:sldMk cId="1144188503" sldId="296"/>
+            <ac:cxnSpMk id="201" creationId="{7B2075F3-49F1-4561-B16C-A60D139B4E39}"/>
+          </ac:cxnSpMkLst>
+        </pc:cxnChg>
+        <pc:cxnChg chg="mod">
+          <ac:chgData name="Sofi Fernández" userId="5dcd86d9bf03d87f" providerId="LiveId" clId="{0D968FC9-45FF-4A34-9D4F-223E4420D3F4}" dt="2023-11-10T12:48:32.550" v="716" actId="1036"/>
+          <ac:cxnSpMkLst>
+            <pc:docMk/>
+            <pc:sldMk cId="1144188503" sldId="296"/>
+            <ac:cxnSpMk id="206" creationId="{3075AB11-BAD3-42E5-BC8F-B1153E21F91C}"/>
+          </ac:cxnSpMkLst>
+        </pc:cxnChg>
+      </pc:sldChg>
+    </pc:docChg>
+  </pc:docChgLst>
+  <pc:docChgLst>
     <pc:chgData name="Sofi Fernández" userId="5dcd86d9bf03d87f" providerId="LiveId" clId="{560B0A52-DFB1-40FD-8FE4-9B1DF7690351}"/>
     <pc:docChg chg="undo custSel delSld modSld">
       <pc:chgData name="Sofi Fernández" userId="5dcd86d9bf03d87f" providerId="LiveId" clId="{560B0A52-DFB1-40FD-8FE4-9B1DF7690351}" dt="2023-11-10T17:14:53.086" v="263" actId="1076"/>
@@ -457,806 +1257,6 @@
       </pc:sldChg>
     </pc:docChg>
   </pc:docChgLst>
-  <pc:docChgLst>
-    <pc:chgData name="Sofi Fernández" userId="5dcd86d9bf03d87f" providerId="LiveId" clId="{0D968FC9-45FF-4A34-9D4F-223E4420D3F4}"/>
-    <pc:docChg chg="undo custSel modSld sldOrd">
-      <pc:chgData name="Sofi Fernández" userId="5dcd86d9bf03d87f" providerId="LiveId" clId="{0D968FC9-45FF-4A34-9D4F-223E4420D3F4}" dt="2023-11-10T12:56:08.665" v="835" actId="478"/>
-      <pc:docMkLst>
-        <pc:docMk/>
-      </pc:docMkLst>
-      <pc:sldChg chg="addSp delSp modSp mod ord">
-        <pc:chgData name="Sofi Fernández" userId="5dcd86d9bf03d87f" providerId="LiveId" clId="{0D968FC9-45FF-4A34-9D4F-223E4420D3F4}" dt="2023-11-10T12:56:08.665" v="835" actId="478"/>
-        <pc:sldMkLst>
-          <pc:docMk/>
-          <pc:sldMk cId="1144188503" sldId="296"/>
-        </pc:sldMkLst>
-        <pc:spChg chg="del">
-          <ac:chgData name="Sofi Fernández" userId="5dcd86d9bf03d87f" providerId="LiveId" clId="{0D968FC9-45FF-4A34-9D4F-223E4420D3F4}" dt="2023-11-09T18:31:31.787" v="293" actId="478"/>
-          <ac:spMkLst>
-            <pc:docMk/>
-            <pc:sldMk cId="1144188503" sldId="296"/>
-            <ac:spMk id="2" creationId="{87926A82-6166-466D-A3A3-E32A7AC2BFCA}"/>
-          </ac:spMkLst>
-        </pc:spChg>
-        <pc:spChg chg="del">
-          <ac:chgData name="Sofi Fernández" userId="5dcd86d9bf03d87f" providerId="LiveId" clId="{0D968FC9-45FF-4A34-9D4F-223E4420D3F4}" dt="2023-11-09T17:41:35.648" v="0" actId="478"/>
-          <ac:spMkLst>
-            <pc:docMk/>
-            <pc:sldMk cId="1144188503" sldId="296"/>
-            <ac:spMk id="3" creationId="{E3C639A2-8920-756D-0214-8FF54142B917}"/>
-          </ac:spMkLst>
-        </pc:spChg>
-        <pc:spChg chg="del">
-          <ac:chgData name="Sofi Fernández" userId="5dcd86d9bf03d87f" providerId="LiveId" clId="{0D968FC9-45FF-4A34-9D4F-223E4420D3F4}" dt="2023-11-09T17:41:36.976" v="1" actId="478"/>
-          <ac:spMkLst>
-            <pc:docMk/>
-            <pc:sldMk cId="1144188503" sldId="296"/>
-            <ac:spMk id="4" creationId="{74055C55-2E77-4139-8670-5F4B84119D2D}"/>
-          </ac:spMkLst>
-        </pc:spChg>
-        <pc:spChg chg="del">
-          <ac:chgData name="Sofi Fernández" userId="5dcd86d9bf03d87f" providerId="LiveId" clId="{0D968FC9-45FF-4A34-9D4F-223E4420D3F4}" dt="2023-11-09T18:31:27.351" v="291" actId="478"/>
-          <ac:spMkLst>
-            <pc:docMk/>
-            <pc:sldMk cId="1144188503" sldId="296"/>
-            <ac:spMk id="5" creationId="{66D9B4A0-411D-4E7F-AB9E-95DE069B5C77}"/>
-          </ac:spMkLst>
-        </pc:spChg>
-        <pc:spChg chg="mod">
-          <ac:chgData name="Sofi Fernández" userId="5dcd86d9bf03d87f" providerId="LiveId" clId="{0D968FC9-45FF-4A34-9D4F-223E4420D3F4}" dt="2023-11-10T12:48:32.550" v="716" actId="1036"/>
-          <ac:spMkLst>
-            <pc:docMk/>
-            <pc:sldMk cId="1144188503" sldId="296"/>
-            <ac:spMk id="8" creationId="{908667E9-63CD-CCB9-B7B3-1CCF2F04E43A}"/>
-          </ac:spMkLst>
-        </pc:spChg>
-        <pc:spChg chg="mod">
-          <ac:chgData name="Sofi Fernández" userId="5dcd86d9bf03d87f" providerId="LiveId" clId="{0D968FC9-45FF-4A34-9D4F-223E4420D3F4}" dt="2023-11-10T12:48:32.550" v="716" actId="1036"/>
-          <ac:spMkLst>
-            <pc:docMk/>
-            <pc:sldMk cId="1144188503" sldId="296"/>
-            <ac:spMk id="9" creationId="{FBEBDD9E-FB07-3927-7B60-8ABDD2A7ABC5}"/>
-          </ac:spMkLst>
-        </pc:spChg>
-        <pc:spChg chg="add mod">
-          <ac:chgData name="Sofi Fernández" userId="5dcd86d9bf03d87f" providerId="LiveId" clId="{0D968FC9-45FF-4A34-9D4F-223E4420D3F4}" dt="2023-11-10T12:49:36.632" v="751" actId="1038"/>
-          <ac:spMkLst>
-            <pc:docMk/>
-            <pc:sldMk cId="1144188503" sldId="296"/>
-            <ac:spMk id="11" creationId="{C319D7A2-CBE6-9B75-57DA-268AC9C904D9}"/>
-          </ac:spMkLst>
-        </pc:spChg>
-        <pc:spChg chg="mod">
-          <ac:chgData name="Sofi Fernández" userId="5dcd86d9bf03d87f" providerId="LiveId" clId="{0D968FC9-45FF-4A34-9D4F-223E4420D3F4}" dt="2023-11-10T12:47:28.002" v="704" actId="1036"/>
-          <ac:spMkLst>
-            <pc:docMk/>
-            <pc:sldMk cId="1144188503" sldId="296"/>
-            <ac:spMk id="15" creationId="{89F54F0C-1EC0-11EF-D128-BF5293ACBB34}"/>
-          </ac:spMkLst>
-        </pc:spChg>
-        <pc:spChg chg="mod">
-          <ac:chgData name="Sofi Fernández" userId="5dcd86d9bf03d87f" providerId="LiveId" clId="{0D968FC9-45FF-4A34-9D4F-223E4420D3F4}" dt="2023-11-10T12:47:28.002" v="704" actId="1036"/>
-          <ac:spMkLst>
-            <pc:docMk/>
-            <pc:sldMk cId="1144188503" sldId="296"/>
-            <ac:spMk id="16" creationId="{A4B7FB05-B82B-7B42-B978-9293DEF66438}"/>
-          </ac:spMkLst>
-        </pc:spChg>
-        <pc:spChg chg="mod ord">
-          <ac:chgData name="Sofi Fernández" userId="5dcd86d9bf03d87f" providerId="LiveId" clId="{0D968FC9-45FF-4A34-9D4F-223E4420D3F4}" dt="2023-11-10T12:47:28.002" v="704" actId="1036"/>
-          <ac:spMkLst>
-            <pc:docMk/>
-            <pc:sldMk cId="1144188503" sldId="296"/>
-            <ac:spMk id="17" creationId="{2964EC17-BEB6-ABA8-15B2-2FBF65F4B2E5}"/>
-          </ac:spMkLst>
-        </pc:spChg>
-        <pc:spChg chg="mod">
-          <ac:chgData name="Sofi Fernández" userId="5dcd86d9bf03d87f" providerId="LiveId" clId="{0D968FC9-45FF-4A34-9D4F-223E4420D3F4}" dt="2023-11-10T12:47:28.002" v="704" actId="1036"/>
-          <ac:spMkLst>
-            <pc:docMk/>
-            <pc:sldMk cId="1144188503" sldId="296"/>
-            <ac:spMk id="18" creationId="{912543CF-3BD4-40B0-BB18-006DCC4331CA}"/>
-          </ac:spMkLst>
-        </pc:spChg>
-        <pc:spChg chg="mod">
-          <ac:chgData name="Sofi Fernández" userId="5dcd86d9bf03d87f" providerId="LiveId" clId="{0D968FC9-45FF-4A34-9D4F-223E4420D3F4}" dt="2023-11-10T12:47:28.002" v="704" actId="1036"/>
-          <ac:spMkLst>
-            <pc:docMk/>
-            <pc:sldMk cId="1144188503" sldId="296"/>
-            <ac:spMk id="19" creationId="{47933AAD-8607-D17B-EE14-2B6909C2339A}"/>
-          </ac:spMkLst>
-        </pc:spChg>
-        <pc:spChg chg="add mod ord">
-          <ac:chgData name="Sofi Fernández" userId="5dcd86d9bf03d87f" providerId="LiveId" clId="{0D968FC9-45FF-4A34-9D4F-223E4420D3F4}" dt="2023-11-10T12:47:28.002" v="704" actId="1036"/>
-          <ac:spMkLst>
-            <pc:docMk/>
-            <pc:sldMk cId="1144188503" sldId="296"/>
-            <ac:spMk id="20" creationId="{EA8B7B4F-5512-DCDB-D34A-7DA9AD9833B7}"/>
-          </ac:spMkLst>
-        </pc:spChg>
-        <pc:spChg chg="add mod">
-          <ac:chgData name="Sofi Fernández" userId="5dcd86d9bf03d87f" providerId="LiveId" clId="{0D968FC9-45FF-4A34-9D4F-223E4420D3F4}" dt="2023-11-10T12:48:32.550" v="716" actId="1036"/>
-          <ac:spMkLst>
-            <pc:docMk/>
-            <pc:sldMk cId="1144188503" sldId="296"/>
-            <ac:spMk id="21" creationId="{62CD0829-A33B-AB7A-8085-5588882231E6}"/>
-          </ac:spMkLst>
-        </pc:spChg>
-        <pc:spChg chg="add del mod">
-          <ac:chgData name="Sofi Fernández" userId="5dcd86d9bf03d87f" providerId="LiveId" clId="{0D968FC9-45FF-4A34-9D4F-223E4420D3F4}" dt="2023-11-10T12:45:45.381" v="657" actId="478"/>
-          <ac:spMkLst>
-            <pc:docMk/>
-            <pc:sldMk cId="1144188503" sldId="296"/>
-            <ac:spMk id="24" creationId="{A5EEBF19-3B39-D083-FC97-89A03D11ABCB}"/>
-          </ac:spMkLst>
-        </pc:spChg>
-        <pc:spChg chg="add mod">
-          <ac:chgData name="Sofi Fernández" userId="5dcd86d9bf03d87f" providerId="LiveId" clId="{0D968FC9-45FF-4A34-9D4F-223E4420D3F4}" dt="2023-11-10T12:49:36.632" v="751" actId="1038"/>
-          <ac:spMkLst>
-            <pc:docMk/>
-            <pc:sldMk cId="1144188503" sldId="296"/>
-            <ac:spMk id="25" creationId="{D93F28AC-D204-EEB0-FF8E-160AFC53B257}"/>
-          </ac:spMkLst>
-        </pc:spChg>
-        <pc:spChg chg="add mod">
-          <ac:chgData name="Sofi Fernández" userId="5dcd86d9bf03d87f" providerId="LiveId" clId="{0D968FC9-45FF-4A34-9D4F-223E4420D3F4}" dt="2023-11-10T12:47:28.002" v="704" actId="1036"/>
-          <ac:spMkLst>
-            <pc:docMk/>
-            <pc:sldMk cId="1144188503" sldId="296"/>
-            <ac:spMk id="26" creationId="{FDA0F5C0-6EAE-BF83-B4CB-8403D97FF945}"/>
-          </ac:spMkLst>
-        </pc:spChg>
-        <pc:spChg chg="add del mod">
-          <ac:chgData name="Sofi Fernández" userId="5dcd86d9bf03d87f" providerId="LiveId" clId="{0D968FC9-45FF-4A34-9D4F-223E4420D3F4}" dt="2023-11-09T18:27:08.021" v="243" actId="478"/>
-          <ac:spMkLst>
-            <pc:docMk/>
-            <pc:sldMk cId="1144188503" sldId="296"/>
-            <ac:spMk id="27" creationId="{DFC530A0-1C45-D057-A08B-9FF3942B5CC8}"/>
-          </ac:spMkLst>
-        </pc:spChg>
-        <pc:spChg chg="add mod">
-          <ac:chgData name="Sofi Fernández" userId="5dcd86d9bf03d87f" providerId="LiveId" clId="{0D968FC9-45FF-4A34-9D4F-223E4420D3F4}" dt="2023-11-10T12:50:15.481" v="756" actId="108"/>
-          <ac:spMkLst>
-            <pc:docMk/>
-            <pc:sldMk cId="1144188503" sldId="296"/>
-            <ac:spMk id="28" creationId="{06D81CBD-FDF8-33A1-F2D6-9A6F8271A9A5}"/>
-          </ac:spMkLst>
-        </pc:spChg>
-        <pc:spChg chg="add mod">
-          <ac:chgData name="Sofi Fernández" userId="5dcd86d9bf03d87f" providerId="LiveId" clId="{0D968FC9-45FF-4A34-9D4F-223E4420D3F4}" dt="2023-11-10T12:47:28.002" v="704" actId="1036"/>
-          <ac:spMkLst>
-            <pc:docMk/>
-            <pc:sldMk cId="1144188503" sldId="296"/>
-            <ac:spMk id="29" creationId="{667A6FFB-2FCB-A615-30B0-AECDE6F04DEC}"/>
-          </ac:spMkLst>
-        </pc:spChg>
-        <pc:spChg chg="add mod">
-          <ac:chgData name="Sofi Fernández" userId="5dcd86d9bf03d87f" providerId="LiveId" clId="{0D968FC9-45FF-4A34-9D4F-223E4420D3F4}" dt="2023-11-10T12:47:28.002" v="704" actId="1036"/>
-          <ac:spMkLst>
-            <pc:docMk/>
-            <pc:sldMk cId="1144188503" sldId="296"/>
-            <ac:spMk id="30" creationId="{139BDC3B-A60D-A898-7C9F-23A3339D4E17}"/>
-          </ac:spMkLst>
-        </pc:spChg>
-        <pc:spChg chg="add mod ord">
-          <ac:chgData name="Sofi Fernández" userId="5dcd86d9bf03d87f" providerId="LiveId" clId="{0D968FC9-45FF-4A34-9D4F-223E4420D3F4}" dt="2023-11-10T12:50:10.832" v="755" actId="1582"/>
-          <ac:spMkLst>
-            <pc:docMk/>
-            <pc:sldMk cId="1144188503" sldId="296"/>
-            <ac:spMk id="31" creationId="{5F4ADECE-E8B2-4A99-F69B-57119A234FB7}"/>
-          </ac:spMkLst>
-        </pc:spChg>
-        <pc:spChg chg="add mod">
-          <ac:chgData name="Sofi Fernández" userId="5dcd86d9bf03d87f" providerId="LiveId" clId="{0D968FC9-45FF-4A34-9D4F-223E4420D3F4}" dt="2023-11-10T12:48:32.550" v="716" actId="1036"/>
-          <ac:spMkLst>
-            <pc:docMk/>
-            <pc:sldMk cId="1144188503" sldId="296"/>
-            <ac:spMk id="35" creationId="{7AE7F7A3-95BF-E025-5629-96DCCAA1B875}"/>
-          </ac:spMkLst>
-        </pc:spChg>
-        <pc:spChg chg="add mod">
-          <ac:chgData name="Sofi Fernández" userId="5dcd86d9bf03d87f" providerId="LiveId" clId="{0D968FC9-45FF-4A34-9D4F-223E4420D3F4}" dt="2023-11-10T12:48:32.550" v="716" actId="1036"/>
-          <ac:spMkLst>
-            <pc:docMk/>
-            <pc:sldMk cId="1144188503" sldId="296"/>
-            <ac:spMk id="36" creationId="{9D4BAB41-B445-7692-B325-B3FBA8314FBA}"/>
-          </ac:spMkLst>
-        </pc:spChg>
-        <pc:spChg chg="add mod">
-          <ac:chgData name="Sofi Fernández" userId="5dcd86d9bf03d87f" providerId="LiveId" clId="{0D968FC9-45FF-4A34-9D4F-223E4420D3F4}" dt="2023-11-10T12:48:32.550" v="716" actId="1036"/>
-          <ac:spMkLst>
-            <pc:docMk/>
-            <pc:sldMk cId="1144188503" sldId="296"/>
-            <ac:spMk id="37" creationId="{8A735F5F-1803-D0AC-8E4D-EAA9AA96037D}"/>
-          </ac:spMkLst>
-        </pc:spChg>
-        <pc:spChg chg="add mod">
-          <ac:chgData name="Sofi Fernández" userId="5dcd86d9bf03d87f" providerId="LiveId" clId="{0D968FC9-45FF-4A34-9D4F-223E4420D3F4}" dt="2023-11-10T12:50:17.771" v="757" actId="108"/>
-          <ac:spMkLst>
-            <pc:docMk/>
-            <pc:sldMk cId="1144188503" sldId="296"/>
-            <ac:spMk id="46" creationId="{F08F5298-F69C-C19D-27A7-416234861554}"/>
-          </ac:spMkLst>
-        </pc:spChg>
-        <pc:spChg chg="add del mod">
-          <ac:chgData name="Sofi Fernández" userId="5dcd86d9bf03d87f" providerId="LiveId" clId="{0D968FC9-45FF-4A34-9D4F-223E4420D3F4}" dt="2023-11-09T18:31:30.275" v="292" actId="478"/>
-          <ac:spMkLst>
-            <pc:docMk/>
-            <pc:sldMk cId="1144188503" sldId="296"/>
-            <ac:spMk id="48" creationId="{3D5F68A7-9ABC-2CAA-1B58-D3EF35C8EAE1}"/>
-          </ac:spMkLst>
-        </pc:spChg>
-        <pc:spChg chg="add del mod">
-          <ac:chgData name="Sofi Fernández" userId="5dcd86d9bf03d87f" providerId="LiveId" clId="{0D968FC9-45FF-4A34-9D4F-223E4420D3F4}" dt="2023-11-09T18:31:33.473" v="295" actId="478"/>
-          <ac:spMkLst>
-            <pc:docMk/>
-            <pc:sldMk cId="1144188503" sldId="296"/>
-            <ac:spMk id="50" creationId="{F00CBFB2-30C1-2B80-BA76-E771600383F5}"/>
-          </ac:spMkLst>
-        </pc:spChg>
-        <pc:spChg chg="add mod">
-          <ac:chgData name="Sofi Fernández" userId="5dcd86d9bf03d87f" providerId="LiveId" clId="{0D968FC9-45FF-4A34-9D4F-223E4420D3F4}" dt="2023-11-10T12:48:32.550" v="716" actId="1036"/>
-          <ac:spMkLst>
-            <pc:docMk/>
-            <pc:sldMk cId="1144188503" sldId="296"/>
-            <ac:spMk id="52" creationId="{65488DB7-261C-0203-D762-80DC70F572D5}"/>
-          </ac:spMkLst>
-        </pc:spChg>
-        <pc:spChg chg="add del mod ord">
-          <ac:chgData name="Sofi Fernández" userId="5dcd86d9bf03d87f" providerId="LiveId" clId="{0D968FC9-45FF-4A34-9D4F-223E4420D3F4}" dt="2023-11-10T12:56:08.665" v="835" actId="478"/>
-          <ac:spMkLst>
-            <pc:docMk/>
-            <pc:sldMk cId="1144188503" sldId="296"/>
-            <ac:spMk id="68" creationId="{A520B571-FA8A-8DC9-8472-28BD7CC06A5F}"/>
-          </ac:spMkLst>
-        </pc:spChg>
-        <pc:spChg chg="add mod">
-          <ac:chgData name="Sofi Fernández" userId="5dcd86d9bf03d87f" providerId="LiveId" clId="{0D968FC9-45FF-4A34-9D4F-223E4420D3F4}" dt="2023-11-10T12:56:00.018" v="834" actId="1076"/>
-          <ac:spMkLst>
-            <pc:docMk/>
-            <pc:sldMk cId="1144188503" sldId="296"/>
-            <ac:spMk id="69" creationId="{72CF3CCB-0103-D121-9086-2E6426F425F4}"/>
-          </ac:spMkLst>
-        </pc:spChg>
-        <pc:spChg chg="add mod">
-          <ac:chgData name="Sofi Fernández" userId="5dcd86d9bf03d87f" providerId="LiveId" clId="{0D968FC9-45FF-4A34-9D4F-223E4420D3F4}" dt="2023-11-10T12:56:00.018" v="834" actId="1076"/>
-          <ac:spMkLst>
-            <pc:docMk/>
-            <pc:sldMk cId="1144188503" sldId="296"/>
-            <ac:spMk id="70" creationId="{788299C7-C26D-60CB-9734-F6A8F3013476}"/>
-          </ac:spMkLst>
-        </pc:spChg>
-        <pc:spChg chg="mod">
-          <ac:chgData name="Sofi Fernández" userId="5dcd86d9bf03d87f" providerId="LiveId" clId="{0D968FC9-45FF-4A34-9D4F-223E4420D3F4}" dt="2023-11-10T12:48:00.355" v="706" actId="108"/>
-          <ac:spMkLst>
-            <pc:docMk/>
-            <pc:sldMk cId="1144188503" sldId="296"/>
-            <ac:spMk id="144" creationId="{F21E8B07-0BC6-4DE6-B1E4-773C5D1F75EB}"/>
-          </ac:spMkLst>
-        </pc:spChg>
-        <pc:spChg chg="mod">
-          <ac:chgData name="Sofi Fernández" userId="5dcd86d9bf03d87f" providerId="LiveId" clId="{0D968FC9-45FF-4A34-9D4F-223E4420D3F4}" dt="2023-11-10T12:48:10.278" v="707" actId="1076"/>
-          <ac:spMkLst>
-            <pc:docMk/>
-            <pc:sldMk cId="1144188503" sldId="296"/>
-            <ac:spMk id="147" creationId="{F3AE564E-E1AB-422A-9067-1D83448922D2}"/>
-          </ac:spMkLst>
-        </pc:spChg>
-        <pc:spChg chg="mod">
-          <ac:chgData name="Sofi Fernández" userId="5dcd86d9bf03d87f" providerId="LiveId" clId="{0D968FC9-45FF-4A34-9D4F-223E4420D3F4}" dt="2023-11-10T12:49:14.073" v="721" actId="1582"/>
-          <ac:spMkLst>
-            <pc:docMk/>
-            <pc:sldMk cId="1144188503" sldId="296"/>
-            <ac:spMk id="150" creationId="{A84C8281-0D5E-4BF0-AB85-487647294920}"/>
-          </ac:spMkLst>
-        </pc:spChg>
-        <pc:spChg chg="mod ord">
-          <ac:chgData name="Sofi Fernández" userId="5dcd86d9bf03d87f" providerId="LiveId" clId="{0D968FC9-45FF-4A34-9D4F-223E4420D3F4}" dt="2023-11-10T12:50:21.137" v="758" actId="108"/>
-          <ac:spMkLst>
-            <pc:docMk/>
-            <pc:sldMk cId="1144188503" sldId="296"/>
-            <ac:spMk id="153" creationId="{29118B4F-266C-48F0-8CAF-8BA67DF9A649}"/>
-          </ac:spMkLst>
-        </pc:spChg>
-        <pc:spChg chg="mod">
-          <ac:chgData name="Sofi Fernández" userId="5dcd86d9bf03d87f" providerId="LiveId" clId="{0D968FC9-45FF-4A34-9D4F-223E4420D3F4}" dt="2023-11-10T12:49:17.445" v="722" actId="108"/>
-          <ac:spMkLst>
-            <pc:docMk/>
-            <pc:sldMk cId="1144188503" sldId="296"/>
-            <ac:spMk id="156" creationId="{A2C318BC-6BF6-496E-9A8C-13F9CFE491B5}"/>
-          </ac:spMkLst>
-        </pc:spChg>
-        <pc:spChg chg="mod">
-          <ac:chgData name="Sofi Fernández" userId="5dcd86d9bf03d87f" providerId="LiveId" clId="{0D968FC9-45FF-4A34-9D4F-223E4420D3F4}" dt="2023-11-10T12:49:57.086" v="754" actId="1582"/>
-          <ac:spMkLst>
-            <pc:docMk/>
-            <pc:sldMk cId="1144188503" sldId="296"/>
-            <ac:spMk id="159" creationId="{8EED5A81-D106-422F-8455-CF5F456EB3E0}"/>
-          </ac:spMkLst>
-        </pc:spChg>
-        <pc:spChg chg="mod">
-          <ac:chgData name="Sofi Fernández" userId="5dcd86d9bf03d87f" providerId="LiveId" clId="{0D968FC9-45FF-4A34-9D4F-223E4420D3F4}" dt="2023-11-10T12:47:28.002" v="704" actId="1036"/>
-          <ac:spMkLst>
-            <pc:docMk/>
-            <pc:sldMk cId="1144188503" sldId="296"/>
-            <ac:spMk id="162" creationId="{BD569EE8-357F-4061-8190-6041007FBE4B}"/>
-          </ac:spMkLst>
-        </pc:spChg>
-        <pc:spChg chg="mod">
-          <ac:chgData name="Sofi Fernández" userId="5dcd86d9bf03d87f" providerId="LiveId" clId="{0D968FC9-45FF-4A34-9D4F-223E4420D3F4}" dt="2023-11-10T12:48:32.550" v="716" actId="1036"/>
-          <ac:spMkLst>
-            <pc:docMk/>
-            <pc:sldMk cId="1144188503" sldId="296"/>
-            <ac:spMk id="168" creationId="{6373F713-1680-4734-878B-86B182DC5AA6}"/>
-          </ac:spMkLst>
-        </pc:spChg>
-        <pc:spChg chg="del">
-          <ac:chgData name="Sofi Fernández" userId="5dcd86d9bf03d87f" providerId="LiveId" clId="{0D968FC9-45FF-4A34-9D4F-223E4420D3F4}" dt="2023-11-09T17:46:18.080" v="29" actId="478"/>
-          <ac:spMkLst>
-            <pc:docMk/>
-            <pc:sldMk cId="1144188503" sldId="296"/>
-            <ac:spMk id="171" creationId="{BEFA9A02-F4DD-44E9-86C2-C8ADA3189685}"/>
-          </ac:spMkLst>
-        </pc:spChg>
-        <pc:spChg chg="del">
-          <ac:chgData name="Sofi Fernández" userId="5dcd86d9bf03d87f" providerId="LiveId" clId="{0D968FC9-45FF-4A34-9D4F-223E4420D3F4}" dt="2023-11-09T17:46:21.481" v="30" actId="478"/>
-          <ac:spMkLst>
-            <pc:docMk/>
-            <pc:sldMk cId="1144188503" sldId="296"/>
-            <ac:spMk id="174" creationId="{EE16D351-7B7B-4FCF-8D90-11468672A1EC}"/>
-          </ac:spMkLst>
-        </pc:spChg>
-        <pc:spChg chg="del">
-          <ac:chgData name="Sofi Fernández" userId="5dcd86d9bf03d87f" providerId="LiveId" clId="{0D968FC9-45FF-4A34-9D4F-223E4420D3F4}" dt="2023-11-09T17:46:15.076" v="28" actId="478"/>
-          <ac:spMkLst>
-            <pc:docMk/>
-            <pc:sldMk cId="1144188503" sldId="296"/>
-            <ac:spMk id="177" creationId="{62FE95E2-7899-46D1-BD09-DBC69EBBF739}"/>
-          </ac:spMkLst>
-        </pc:spChg>
-        <pc:spChg chg="mod">
-          <ac:chgData name="Sofi Fernández" userId="5dcd86d9bf03d87f" providerId="LiveId" clId="{0D968FC9-45FF-4A34-9D4F-223E4420D3F4}" dt="2023-11-10T12:47:28.002" v="704" actId="1036"/>
-          <ac:spMkLst>
-            <pc:docMk/>
-            <pc:sldMk cId="1144188503" sldId="296"/>
-            <ac:spMk id="180" creationId="{C93299AE-BEEA-4E5E-88CB-50F2F112D78D}"/>
-          </ac:spMkLst>
-        </pc:spChg>
-        <pc:spChg chg="del">
-          <ac:chgData name="Sofi Fernández" userId="5dcd86d9bf03d87f" providerId="LiveId" clId="{0D968FC9-45FF-4A34-9D4F-223E4420D3F4}" dt="2023-11-09T17:46:03.035" v="25" actId="478"/>
-          <ac:spMkLst>
-            <pc:docMk/>
-            <pc:sldMk cId="1144188503" sldId="296"/>
-            <ac:spMk id="183" creationId="{DC38D3DB-30B8-4A79-9C76-C565CFF33780}"/>
-          </ac:spMkLst>
-        </pc:spChg>
-        <pc:spChg chg="mod">
-          <ac:chgData name="Sofi Fernández" userId="5dcd86d9bf03d87f" providerId="LiveId" clId="{0D968FC9-45FF-4A34-9D4F-223E4420D3F4}" dt="2023-11-10T12:47:28.002" v="704" actId="1036"/>
-          <ac:spMkLst>
-            <pc:docMk/>
-            <pc:sldMk cId="1144188503" sldId="296"/>
-            <ac:spMk id="186" creationId="{E00EF2F1-621C-44D5-923A-283EAD95A813}"/>
-          </ac:spMkLst>
-        </pc:spChg>
-        <pc:spChg chg="mod">
-          <ac:chgData name="Sofi Fernández" userId="5dcd86d9bf03d87f" providerId="LiveId" clId="{0D968FC9-45FF-4A34-9D4F-223E4420D3F4}" dt="2023-11-10T12:47:28.002" v="704" actId="1036"/>
-          <ac:spMkLst>
-            <pc:docMk/>
-            <pc:sldMk cId="1144188503" sldId="296"/>
-            <ac:spMk id="189" creationId="{AF7D30AD-3130-40C6-8BC9-7EE80B4B9A00}"/>
-          </ac:spMkLst>
-        </pc:spChg>
-        <pc:spChg chg="del">
-          <ac:chgData name="Sofi Fernández" userId="5dcd86d9bf03d87f" providerId="LiveId" clId="{0D968FC9-45FF-4A34-9D4F-223E4420D3F4}" dt="2023-11-09T17:46:05.761" v="26" actId="478"/>
-          <ac:spMkLst>
-            <pc:docMk/>
-            <pc:sldMk cId="1144188503" sldId="296"/>
-            <ac:spMk id="192" creationId="{7893426B-E83B-41DC-A793-6BBC6104B3A6}"/>
-          </ac:spMkLst>
-        </pc:spChg>
-        <pc:spChg chg="del">
-          <ac:chgData name="Sofi Fernández" userId="5dcd86d9bf03d87f" providerId="LiveId" clId="{0D968FC9-45FF-4A34-9D4F-223E4420D3F4}" dt="2023-11-09T17:46:10.911" v="27" actId="478"/>
-          <ac:spMkLst>
-            <pc:docMk/>
-            <pc:sldMk cId="1144188503" sldId="296"/>
-            <ac:spMk id="195" creationId="{81AC151D-872D-4D73-AE29-952F653257C0}"/>
-          </ac:spMkLst>
-        </pc:spChg>
-        <pc:spChg chg="del mod">
-          <ac:chgData name="Sofi Fernández" userId="5dcd86d9bf03d87f" providerId="LiveId" clId="{0D968FC9-45FF-4A34-9D4F-223E4420D3F4}" dt="2023-11-10T12:55:17.144" v="829" actId="478"/>
-          <ac:spMkLst>
-            <pc:docMk/>
-            <pc:sldMk cId="1144188503" sldId="296"/>
-            <ac:spMk id="210" creationId="{3D0CC422-902A-4D8F-AA6A-E9A681A2E9BF}"/>
-          </ac:spMkLst>
-        </pc:spChg>
-        <pc:spChg chg="del mod">
-          <ac:chgData name="Sofi Fernández" userId="5dcd86d9bf03d87f" providerId="LiveId" clId="{0D968FC9-45FF-4A34-9D4F-223E4420D3F4}" dt="2023-11-10T12:55:17.144" v="829" actId="478"/>
-          <ac:spMkLst>
-            <pc:docMk/>
-            <pc:sldMk cId="1144188503" sldId="296"/>
-            <ac:spMk id="212" creationId="{78525528-D696-4051-A168-1EEDC39E1520}"/>
-          </ac:spMkLst>
-        </pc:spChg>
-        <pc:spChg chg="mod">
-          <ac:chgData name="Sofi Fernández" userId="5dcd86d9bf03d87f" providerId="LiveId" clId="{0D968FC9-45FF-4A34-9D4F-223E4420D3F4}" dt="2023-11-10T12:56:00.018" v="834" actId="1076"/>
-          <ac:spMkLst>
-            <pc:docMk/>
-            <pc:sldMk cId="1144188503" sldId="296"/>
-            <ac:spMk id="214" creationId="{16704A75-B346-4E41-B0E5-B89322F3AE57}"/>
-          </ac:spMkLst>
-        </pc:spChg>
-        <pc:spChg chg="mod">
-          <ac:chgData name="Sofi Fernández" userId="5dcd86d9bf03d87f" providerId="LiveId" clId="{0D968FC9-45FF-4A34-9D4F-223E4420D3F4}" dt="2023-11-10T12:56:00.018" v="834" actId="1076"/>
-          <ac:spMkLst>
-            <pc:docMk/>
-            <pc:sldMk cId="1144188503" sldId="296"/>
-            <ac:spMk id="216" creationId="{1E2D3A68-A542-48BA-A217-B074F4C32E1F}"/>
-          </ac:spMkLst>
-        </pc:spChg>
-        <pc:spChg chg="mod">
-          <ac:chgData name="Sofi Fernández" userId="5dcd86d9bf03d87f" providerId="LiveId" clId="{0D968FC9-45FF-4A34-9D4F-223E4420D3F4}" dt="2023-11-10T12:56:00.018" v="834" actId="1076"/>
-          <ac:spMkLst>
-            <pc:docMk/>
-            <pc:sldMk cId="1144188503" sldId="296"/>
-            <ac:spMk id="218" creationId="{A50A05D4-FD98-47D3-A6F4-E18865EE4200}"/>
-          </ac:spMkLst>
-        </pc:spChg>
-        <pc:spChg chg="mod">
-          <ac:chgData name="Sofi Fernández" userId="5dcd86d9bf03d87f" providerId="LiveId" clId="{0D968FC9-45FF-4A34-9D4F-223E4420D3F4}" dt="2023-11-10T12:56:00.018" v="834" actId="1076"/>
-          <ac:spMkLst>
-            <pc:docMk/>
-            <pc:sldMk cId="1144188503" sldId="296"/>
-            <ac:spMk id="220" creationId="{F6A83501-0BBC-4414-A5AC-BA2E93F7106C}"/>
-          </ac:spMkLst>
-        </pc:spChg>
-        <pc:cxnChg chg="add mod">
-          <ac:chgData name="Sofi Fernández" userId="5dcd86d9bf03d87f" providerId="LiveId" clId="{0D968FC9-45FF-4A34-9D4F-223E4420D3F4}" dt="2023-11-10T12:47:28.002" v="704" actId="1036"/>
-          <ac:cxnSpMkLst>
-            <pc:docMk/>
-            <pc:sldMk cId="1144188503" sldId="296"/>
-            <ac:cxnSpMk id="3" creationId="{153D6B9D-AECA-FDC9-9F73-8481F6B84598}"/>
-          </ac:cxnSpMkLst>
-        </pc:cxnChg>
-        <pc:cxnChg chg="add mod">
-          <ac:chgData name="Sofi Fernández" userId="5dcd86d9bf03d87f" providerId="LiveId" clId="{0D968FC9-45FF-4A34-9D4F-223E4420D3F4}" dt="2023-11-10T12:47:28.002" v="704" actId="1036"/>
-          <ac:cxnSpMkLst>
-            <pc:docMk/>
-            <pc:sldMk cId="1144188503" sldId="296"/>
-            <ac:cxnSpMk id="4" creationId="{3D0457FE-E176-DF3E-58C2-26574510611D}"/>
-          </ac:cxnSpMkLst>
-        </pc:cxnChg>
-        <pc:cxnChg chg="add mod ord">
-          <ac:chgData name="Sofi Fernández" userId="5dcd86d9bf03d87f" providerId="LiveId" clId="{0D968FC9-45FF-4A34-9D4F-223E4420D3F4}" dt="2023-11-10T12:49:36.632" v="751" actId="1038"/>
-          <ac:cxnSpMkLst>
-            <pc:docMk/>
-            <pc:sldMk cId="1144188503" sldId="296"/>
-            <ac:cxnSpMk id="6" creationId="{1E9F909B-FEAE-4470-5D06-37F45B01947B}"/>
-          </ac:cxnSpMkLst>
-        </pc:cxnChg>
-        <pc:cxnChg chg="mod">
-          <ac:chgData name="Sofi Fernández" userId="5dcd86d9bf03d87f" providerId="LiveId" clId="{0D968FC9-45FF-4A34-9D4F-223E4420D3F4}" dt="2023-11-10T12:47:28.002" v="704" actId="1036"/>
-          <ac:cxnSpMkLst>
-            <pc:docMk/>
-            <pc:sldMk cId="1144188503" sldId="296"/>
-            <ac:cxnSpMk id="7" creationId="{1C54223A-2F2C-4434-A30B-92D8CEE93CF0}"/>
-          </ac:cxnSpMkLst>
-        </pc:cxnChg>
-        <pc:cxnChg chg="add del mod">
-          <ac:chgData name="Sofi Fernández" userId="5dcd86d9bf03d87f" providerId="LiveId" clId="{0D968FC9-45FF-4A34-9D4F-223E4420D3F4}" dt="2023-11-10T12:35:45.103" v="482"/>
-          <ac:cxnSpMkLst>
-            <pc:docMk/>
-            <pc:sldMk cId="1144188503" sldId="296"/>
-            <ac:cxnSpMk id="12" creationId="{8E2C2D45-BAD4-03A4-E3A0-EA37E5C9F20B}"/>
-          </ac:cxnSpMkLst>
-        </pc:cxnChg>
-        <pc:cxnChg chg="add del mod">
-          <ac:chgData name="Sofi Fernández" userId="5dcd86d9bf03d87f" providerId="LiveId" clId="{0D968FC9-45FF-4A34-9D4F-223E4420D3F4}" dt="2023-11-10T12:35:45.103" v="482"/>
-          <ac:cxnSpMkLst>
-            <pc:docMk/>
-            <pc:sldMk cId="1144188503" sldId="296"/>
-            <ac:cxnSpMk id="13" creationId="{DFA1D7DC-0FD2-38BC-89C7-D4899EB73924}"/>
-          </ac:cxnSpMkLst>
-        </pc:cxnChg>
-        <pc:cxnChg chg="add mod">
-          <ac:chgData name="Sofi Fernández" userId="5dcd86d9bf03d87f" providerId="LiveId" clId="{0D968FC9-45FF-4A34-9D4F-223E4420D3F4}" dt="2023-11-10T12:49:36.632" v="751" actId="1038"/>
-          <ac:cxnSpMkLst>
-            <pc:docMk/>
-            <pc:sldMk cId="1144188503" sldId="296"/>
-            <ac:cxnSpMk id="14" creationId="{DDA3F3B1-21EE-C324-46F5-6D35AACB13B1}"/>
-          </ac:cxnSpMkLst>
-        </pc:cxnChg>
-        <pc:cxnChg chg="add mod">
-          <ac:chgData name="Sofi Fernández" userId="5dcd86d9bf03d87f" providerId="LiveId" clId="{0D968FC9-45FF-4A34-9D4F-223E4420D3F4}" dt="2023-11-10T12:49:36.632" v="751" actId="1038"/>
-          <ac:cxnSpMkLst>
-            <pc:docMk/>
-            <pc:sldMk cId="1144188503" sldId="296"/>
-            <ac:cxnSpMk id="22" creationId="{73C3940F-2361-EC72-2C73-8BA7558D0004}"/>
-          </ac:cxnSpMkLst>
-        </pc:cxnChg>
-        <pc:cxnChg chg="add mod">
-          <ac:chgData name="Sofi Fernández" userId="5dcd86d9bf03d87f" providerId="LiveId" clId="{0D968FC9-45FF-4A34-9D4F-223E4420D3F4}" dt="2023-11-10T12:47:28.002" v="704" actId="1036"/>
-          <ac:cxnSpMkLst>
-            <pc:docMk/>
-            <pc:sldMk cId="1144188503" sldId="296"/>
-            <ac:cxnSpMk id="23" creationId="{E73F44B0-9E2C-B4F7-23D1-18BD4366A740}"/>
-          </ac:cxnSpMkLst>
-        </pc:cxnChg>
-        <pc:cxnChg chg="add mod">
-          <ac:chgData name="Sofi Fernández" userId="5dcd86d9bf03d87f" providerId="LiveId" clId="{0D968FC9-45FF-4A34-9D4F-223E4420D3F4}" dt="2023-11-10T12:49:36.632" v="751" actId="1038"/>
-          <ac:cxnSpMkLst>
-            <pc:docMk/>
-            <pc:sldMk cId="1144188503" sldId="296"/>
-            <ac:cxnSpMk id="27" creationId="{2F4EE79B-85BA-36C9-B13C-9B683F246C5B}"/>
-          </ac:cxnSpMkLst>
-        </pc:cxnChg>
-        <pc:cxnChg chg="add mod">
-          <ac:chgData name="Sofi Fernández" userId="5dcd86d9bf03d87f" providerId="LiveId" clId="{0D968FC9-45FF-4A34-9D4F-223E4420D3F4}" dt="2023-11-10T12:48:32.550" v="716" actId="1036"/>
-          <ac:cxnSpMkLst>
-            <pc:docMk/>
-            <pc:sldMk cId="1144188503" sldId="296"/>
-            <ac:cxnSpMk id="33" creationId="{36BA6F7E-8C1C-1A07-E081-E5205F99A5D2}"/>
-          </ac:cxnSpMkLst>
-        </pc:cxnChg>
-        <pc:cxnChg chg="add del mod">
-          <ac:chgData name="Sofi Fernández" userId="5dcd86d9bf03d87f" providerId="LiveId" clId="{0D968FC9-45FF-4A34-9D4F-223E4420D3F4}" dt="2023-11-10T12:44:00.006" v="597" actId="478"/>
-          <ac:cxnSpMkLst>
-            <pc:docMk/>
-            <pc:sldMk cId="1144188503" sldId="296"/>
-            <ac:cxnSpMk id="34" creationId="{296C1B27-9B9A-1C46-C727-E5CF349ACB94}"/>
-          </ac:cxnSpMkLst>
-        </pc:cxnChg>
-        <pc:cxnChg chg="add mod">
-          <ac:chgData name="Sofi Fernández" userId="5dcd86d9bf03d87f" providerId="LiveId" clId="{0D968FC9-45FF-4A34-9D4F-223E4420D3F4}" dt="2023-11-10T12:48:32.550" v="716" actId="1036"/>
-          <ac:cxnSpMkLst>
-            <pc:docMk/>
-            <pc:sldMk cId="1144188503" sldId="296"/>
-            <ac:cxnSpMk id="38" creationId="{AE0AF7B2-1287-C203-F874-AB82BFD4A12E}"/>
-          </ac:cxnSpMkLst>
-        </pc:cxnChg>
-        <pc:cxnChg chg="add mod">
-          <ac:chgData name="Sofi Fernández" userId="5dcd86d9bf03d87f" providerId="LiveId" clId="{0D968FC9-45FF-4A34-9D4F-223E4420D3F4}" dt="2023-11-10T12:48:32.550" v="716" actId="1036"/>
-          <ac:cxnSpMkLst>
-            <pc:docMk/>
-            <pc:sldMk cId="1144188503" sldId="296"/>
-            <ac:cxnSpMk id="39" creationId="{A342E80F-B813-ADD6-EA4B-0047E83D5216}"/>
-          </ac:cxnSpMkLst>
-        </pc:cxnChg>
-        <pc:cxnChg chg="add mod">
-          <ac:chgData name="Sofi Fernández" userId="5dcd86d9bf03d87f" providerId="LiveId" clId="{0D968FC9-45FF-4A34-9D4F-223E4420D3F4}" dt="2023-11-10T12:48:32.550" v="716" actId="1036"/>
-          <ac:cxnSpMkLst>
-            <pc:docMk/>
-            <pc:sldMk cId="1144188503" sldId="296"/>
-            <ac:cxnSpMk id="40" creationId="{C86D24CA-E429-42E3-73B4-86F245A5AF50}"/>
-          </ac:cxnSpMkLst>
-        </pc:cxnChg>
-        <pc:cxnChg chg="add del mod">
-          <ac:chgData name="Sofi Fernández" userId="5dcd86d9bf03d87f" providerId="LiveId" clId="{0D968FC9-45FF-4A34-9D4F-223E4420D3F4}" dt="2023-11-10T12:48:48.013" v="719" actId="478"/>
-          <ac:cxnSpMkLst>
-            <pc:docMk/>
-            <pc:sldMk cId="1144188503" sldId="296"/>
-            <ac:cxnSpMk id="42" creationId="{7E25FA5D-48DA-38E4-571F-A4EE4F7B7F78}"/>
-          </ac:cxnSpMkLst>
-        </pc:cxnChg>
-        <pc:cxnChg chg="add del mod ord">
-          <ac:chgData name="Sofi Fernández" userId="5dcd86d9bf03d87f" providerId="LiveId" clId="{0D968FC9-45FF-4A34-9D4F-223E4420D3F4}" dt="2023-11-10T12:44:03.685" v="598" actId="478"/>
-          <ac:cxnSpMkLst>
-            <pc:docMk/>
-            <pc:sldMk cId="1144188503" sldId="296"/>
-            <ac:cxnSpMk id="43" creationId="{2960AC5D-996A-10A7-DE15-FE13AAA6BB9D}"/>
-          </ac:cxnSpMkLst>
-        </pc:cxnChg>
-        <pc:cxnChg chg="add mod">
-          <ac:chgData name="Sofi Fernández" userId="5dcd86d9bf03d87f" providerId="LiveId" clId="{0D968FC9-45FF-4A34-9D4F-223E4420D3F4}" dt="2023-11-10T12:47:28.002" v="704" actId="1036"/>
-          <ac:cxnSpMkLst>
-            <pc:docMk/>
-            <pc:sldMk cId="1144188503" sldId="296"/>
-            <ac:cxnSpMk id="50" creationId="{AA6288F6-F9CA-399A-4EFB-5D47F0E96037}"/>
-          </ac:cxnSpMkLst>
-        </pc:cxnChg>
-        <pc:cxnChg chg="add mod">
-          <ac:chgData name="Sofi Fernández" userId="5dcd86d9bf03d87f" providerId="LiveId" clId="{0D968FC9-45FF-4A34-9D4F-223E4420D3F4}" dt="2023-11-10T12:47:28.002" v="704" actId="1036"/>
-          <ac:cxnSpMkLst>
-            <pc:docMk/>
-            <pc:sldMk cId="1144188503" sldId="296"/>
-            <ac:cxnSpMk id="51" creationId="{5D67FC1E-CBF2-E9A7-DEA1-6EEBC9F04F62}"/>
-          </ac:cxnSpMkLst>
-        </pc:cxnChg>
-        <pc:cxnChg chg="add mod">
-          <ac:chgData name="Sofi Fernández" userId="5dcd86d9bf03d87f" providerId="LiveId" clId="{0D968FC9-45FF-4A34-9D4F-223E4420D3F4}" dt="2023-11-10T12:48:32.550" v="716" actId="1036"/>
-          <ac:cxnSpMkLst>
-            <pc:docMk/>
-            <pc:sldMk cId="1144188503" sldId="296"/>
-            <ac:cxnSpMk id="53" creationId="{1318DDEA-94CB-92EE-01AC-873792D72112}"/>
-          </ac:cxnSpMkLst>
-        </pc:cxnChg>
-        <pc:cxnChg chg="add mod">
-          <ac:chgData name="Sofi Fernández" userId="5dcd86d9bf03d87f" providerId="LiveId" clId="{0D968FC9-45FF-4A34-9D4F-223E4420D3F4}" dt="2023-11-10T12:47:28.002" v="704" actId="1036"/>
-          <ac:cxnSpMkLst>
-            <pc:docMk/>
-            <pc:sldMk cId="1144188503" sldId="296"/>
-            <ac:cxnSpMk id="54" creationId="{3C21E375-4ECD-0D46-F913-07E5B916AD77}"/>
-          </ac:cxnSpMkLst>
-        </pc:cxnChg>
-        <pc:cxnChg chg="add mod">
-          <ac:chgData name="Sofi Fernández" userId="5dcd86d9bf03d87f" providerId="LiveId" clId="{0D968FC9-45FF-4A34-9D4F-223E4420D3F4}" dt="2023-11-10T12:47:28.002" v="704" actId="1036"/>
-          <ac:cxnSpMkLst>
-            <pc:docMk/>
-            <pc:sldMk cId="1144188503" sldId="296"/>
-            <ac:cxnSpMk id="55" creationId="{994B101A-D1B7-63CD-99F7-F14FBB59C89D}"/>
-          </ac:cxnSpMkLst>
-        </pc:cxnChg>
-        <pc:cxnChg chg="add mod">
-          <ac:chgData name="Sofi Fernández" userId="5dcd86d9bf03d87f" providerId="LiveId" clId="{0D968FC9-45FF-4A34-9D4F-223E4420D3F4}" dt="2023-11-10T12:47:28.002" v="704" actId="1036"/>
-          <ac:cxnSpMkLst>
-            <pc:docMk/>
-            <pc:sldMk cId="1144188503" sldId="296"/>
-            <ac:cxnSpMk id="56" creationId="{0B6561E8-6B08-77DA-E4EB-BC367E23EFA0}"/>
-          </ac:cxnSpMkLst>
-        </pc:cxnChg>
-        <pc:cxnChg chg="add mod">
-          <ac:chgData name="Sofi Fernández" userId="5dcd86d9bf03d87f" providerId="LiveId" clId="{0D968FC9-45FF-4A34-9D4F-223E4420D3F4}" dt="2023-11-10T12:47:28.002" v="704" actId="1036"/>
-          <ac:cxnSpMkLst>
-            <pc:docMk/>
-            <pc:sldMk cId="1144188503" sldId="296"/>
-            <ac:cxnSpMk id="57" creationId="{5B5E924C-B66B-08CF-6518-7A0048095A5C}"/>
-          </ac:cxnSpMkLst>
-        </pc:cxnChg>
-        <pc:cxnChg chg="add mod">
-          <ac:chgData name="Sofi Fernández" userId="5dcd86d9bf03d87f" providerId="LiveId" clId="{0D968FC9-45FF-4A34-9D4F-223E4420D3F4}" dt="2023-11-10T12:47:28.002" v="704" actId="1036"/>
-          <ac:cxnSpMkLst>
-            <pc:docMk/>
-            <pc:sldMk cId="1144188503" sldId="296"/>
-            <ac:cxnSpMk id="58" creationId="{2ACAA877-A400-6000-A400-42EC61923B70}"/>
-          </ac:cxnSpMkLst>
-        </pc:cxnChg>
-        <pc:cxnChg chg="add del mod">
-          <ac:chgData name="Sofi Fernández" userId="5dcd86d9bf03d87f" providerId="LiveId" clId="{0D968FC9-45FF-4A34-9D4F-223E4420D3F4}" dt="2023-11-10T12:45:06.936" v="656" actId="478"/>
-          <ac:cxnSpMkLst>
-            <pc:docMk/>
-            <pc:sldMk cId="1144188503" sldId="296"/>
-            <ac:cxnSpMk id="59" creationId="{E61D2E47-0758-C44C-E274-901AB5D4F0AD}"/>
-          </ac:cxnSpMkLst>
-        </pc:cxnChg>
-        <pc:cxnChg chg="add mod">
-          <ac:chgData name="Sofi Fernández" userId="5dcd86d9bf03d87f" providerId="LiveId" clId="{0D968FC9-45FF-4A34-9D4F-223E4420D3F4}" dt="2023-11-10T12:48:32.550" v="716" actId="1036"/>
-          <ac:cxnSpMkLst>
-            <pc:docMk/>
-            <pc:sldMk cId="1144188503" sldId="296"/>
-            <ac:cxnSpMk id="61" creationId="{3DF66044-AEAA-3908-0216-048827BA346F}"/>
-          </ac:cxnSpMkLst>
-        </pc:cxnChg>
-        <pc:cxnChg chg="add mod">
-          <ac:chgData name="Sofi Fernández" userId="5dcd86d9bf03d87f" providerId="LiveId" clId="{0D968FC9-45FF-4A34-9D4F-223E4420D3F4}" dt="2023-11-10T12:47:28.002" v="704" actId="1036"/>
-          <ac:cxnSpMkLst>
-            <pc:docMk/>
-            <pc:sldMk cId="1144188503" sldId="296"/>
-            <ac:cxnSpMk id="63" creationId="{989F5311-CC49-3923-E4F5-B7F55FAAC32F}"/>
-          </ac:cxnSpMkLst>
-        </pc:cxnChg>
-        <pc:cxnChg chg="add mod">
-          <ac:chgData name="Sofi Fernández" userId="5dcd86d9bf03d87f" providerId="LiveId" clId="{0D968FC9-45FF-4A34-9D4F-223E4420D3F4}" dt="2023-11-10T12:47:28.002" v="704" actId="1036"/>
-          <ac:cxnSpMkLst>
-            <pc:docMk/>
-            <pc:sldMk cId="1144188503" sldId="296"/>
-            <ac:cxnSpMk id="64" creationId="{92E6D978-D991-9FE7-2318-18A5B222A7D8}"/>
-          </ac:cxnSpMkLst>
-        </pc:cxnChg>
-        <pc:cxnChg chg="add mod">
-          <ac:chgData name="Sofi Fernández" userId="5dcd86d9bf03d87f" providerId="LiveId" clId="{0D968FC9-45FF-4A34-9D4F-223E4420D3F4}" dt="2023-11-10T12:47:28.002" v="704" actId="1036"/>
-          <ac:cxnSpMkLst>
-            <pc:docMk/>
-            <pc:sldMk cId="1144188503" sldId="296"/>
-            <ac:cxnSpMk id="65" creationId="{73A6BD49-B0E0-18FD-6CAB-6D10977769ED}"/>
-          </ac:cxnSpMkLst>
-        </pc:cxnChg>
-        <pc:cxnChg chg="add mod">
-          <ac:chgData name="Sofi Fernández" userId="5dcd86d9bf03d87f" providerId="LiveId" clId="{0D968FC9-45FF-4A34-9D4F-223E4420D3F4}" dt="2023-11-10T12:47:28.002" v="704" actId="1036"/>
-          <ac:cxnSpMkLst>
-            <pc:docMk/>
-            <pc:sldMk cId="1144188503" sldId="296"/>
-            <ac:cxnSpMk id="66" creationId="{0016F92F-072E-9256-3D1D-AF285E6C294B}"/>
-          </ac:cxnSpMkLst>
-        </pc:cxnChg>
-        <pc:cxnChg chg="mod">
-          <ac:chgData name="Sofi Fernández" userId="5dcd86d9bf03d87f" providerId="LiveId" clId="{0D968FC9-45FF-4A34-9D4F-223E4420D3F4}" dt="2023-11-10T12:47:28.002" v="704" actId="1036"/>
-          <ac:cxnSpMkLst>
-            <pc:docMk/>
-            <pc:sldMk cId="1144188503" sldId="296"/>
-            <ac:cxnSpMk id="83" creationId="{6B7B494C-8888-457E-82D1-32EE6B401023}"/>
-          </ac:cxnSpMkLst>
-        </pc:cxnChg>
-        <pc:cxnChg chg="mod">
-          <ac:chgData name="Sofi Fernández" userId="5dcd86d9bf03d87f" providerId="LiveId" clId="{0D968FC9-45FF-4A34-9D4F-223E4420D3F4}" dt="2023-11-10T12:47:28.002" v="704" actId="1036"/>
-          <ac:cxnSpMkLst>
-            <pc:docMk/>
-            <pc:sldMk cId="1144188503" sldId="296"/>
-            <ac:cxnSpMk id="84" creationId="{215A627E-A616-4B35-A822-BCD857D053E8}"/>
-          </ac:cxnSpMkLst>
-        </pc:cxnChg>
-        <pc:cxnChg chg="mod">
-          <ac:chgData name="Sofi Fernández" userId="5dcd86d9bf03d87f" providerId="LiveId" clId="{0D968FC9-45FF-4A34-9D4F-223E4420D3F4}" dt="2023-11-10T12:48:42.339" v="717" actId="14100"/>
-          <ac:cxnSpMkLst>
-            <pc:docMk/>
-            <pc:sldMk cId="1144188503" sldId="296"/>
-            <ac:cxnSpMk id="85" creationId="{338A3F58-952C-4C6C-BE73-668B41F8708D}"/>
-          </ac:cxnSpMkLst>
-        </pc:cxnChg>
-        <pc:cxnChg chg="mod">
-          <ac:chgData name="Sofi Fernández" userId="5dcd86d9bf03d87f" providerId="LiveId" clId="{0D968FC9-45FF-4A34-9D4F-223E4420D3F4}" dt="2023-11-10T12:47:28.002" v="704" actId="1036"/>
-          <ac:cxnSpMkLst>
-            <pc:docMk/>
-            <pc:sldMk cId="1144188503" sldId="296"/>
-            <ac:cxnSpMk id="86" creationId="{499176F8-BEEF-4A37-97C9-A7E8592211E9}"/>
-          </ac:cxnSpMkLst>
-        </pc:cxnChg>
-        <pc:cxnChg chg="del mod">
-          <ac:chgData name="Sofi Fernández" userId="5dcd86d9bf03d87f" providerId="LiveId" clId="{0D968FC9-45FF-4A34-9D4F-223E4420D3F4}" dt="2023-11-10T12:44:06.958" v="599" actId="478"/>
-          <ac:cxnSpMkLst>
-            <pc:docMk/>
-            <pc:sldMk cId="1144188503" sldId="296"/>
-            <ac:cxnSpMk id="87" creationId="{E0A5E395-38A3-4ED8-A1C1-7892BF5B1BE1}"/>
-          </ac:cxnSpMkLst>
-        </pc:cxnChg>
-        <pc:cxnChg chg="mod">
-          <ac:chgData name="Sofi Fernández" userId="5dcd86d9bf03d87f" providerId="LiveId" clId="{0D968FC9-45FF-4A34-9D4F-223E4420D3F4}" dt="2023-11-10T12:47:28.002" v="704" actId="1036"/>
-          <ac:cxnSpMkLst>
-            <pc:docMk/>
-            <pc:sldMk cId="1144188503" sldId="296"/>
-            <ac:cxnSpMk id="96" creationId="{185DC171-E6CD-4880-8EF4-7E0DB7F6C2B2}"/>
-          </ac:cxnSpMkLst>
-        </pc:cxnChg>
-        <pc:cxnChg chg="mod">
-          <ac:chgData name="Sofi Fernández" userId="5dcd86d9bf03d87f" providerId="LiveId" clId="{0D968FC9-45FF-4A34-9D4F-223E4420D3F4}" dt="2023-11-10T12:47:28.002" v="704" actId="1036"/>
-          <ac:cxnSpMkLst>
-            <pc:docMk/>
-            <pc:sldMk cId="1144188503" sldId="296"/>
-            <ac:cxnSpMk id="97" creationId="{B5956150-D730-4D39-8E56-5123DA7B1791}"/>
-          </ac:cxnSpMkLst>
-        </pc:cxnChg>
-        <pc:cxnChg chg="mod">
-          <ac:chgData name="Sofi Fernández" userId="5dcd86d9bf03d87f" providerId="LiveId" clId="{0D968FC9-45FF-4A34-9D4F-223E4420D3F4}" dt="2023-11-10T12:47:28.002" v="704" actId="1036"/>
-          <ac:cxnSpMkLst>
-            <pc:docMk/>
-            <pc:sldMk cId="1144188503" sldId="296"/>
-            <ac:cxnSpMk id="98" creationId="{98000C8A-C564-4106-9005-252681A7FDFB}"/>
-          </ac:cxnSpMkLst>
-        </pc:cxnChg>
-        <pc:cxnChg chg="add del mod">
-          <ac:chgData name="Sofi Fernández" userId="5dcd86d9bf03d87f" providerId="LiveId" clId="{0D968FC9-45FF-4A34-9D4F-223E4420D3F4}" dt="2023-11-10T12:47:28.002" v="704" actId="1036"/>
-          <ac:cxnSpMkLst>
-            <pc:docMk/>
-            <pc:sldMk cId="1144188503" sldId="296"/>
-            <ac:cxnSpMk id="99" creationId="{DFAFA2FD-B58C-4CB3-83BF-D7037A44C5EA}"/>
-          </ac:cxnSpMkLst>
-        </pc:cxnChg>
-        <pc:cxnChg chg="del mod">
-          <ac:chgData name="Sofi Fernández" userId="5dcd86d9bf03d87f" providerId="LiveId" clId="{0D968FC9-45FF-4A34-9D4F-223E4420D3F4}" dt="2023-11-09T18:42:10.800" v="416" actId="478"/>
-          <ac:cxnSpMkLst>
-            <pc:docMk/>
-            <pc:sldMk cId="1144188503" sldId="296"/>
-            <ac:cxnSpMk id="100" creationId="{92CA40FF-E75F-4233-A382-4E9DE1FACF8D}"/>
-          </ac:cxnSpMkLst>
-        </pc:cxnChg>
-        <pc:cxnChg chg="mod">
-          <ac:chgData name="Sofi Fernández" userId="5dcd86d9bf03d87f" providerId="LiveId" clId="{0D968FC9-45FF-4A34-9D4F-223E4420D3F4}" dt="2023-11-10T12:47:28.002" v="704" actId="1036"/>
-          <ac:cxnSpMkLst>
-            <pc:docMk/>
-            <pc:sldMk cId="1144188503" sldId="296"/>
-            <ac:cxnSpMk id="201" creationId="{7B2075F3-49F1-4561-B16C-A60D139B4E39}"/>
-          </ac:cxnSpMkLst>
-        </pc:cxnChg>
-        <pc:cxnChg chg="mod">
-          <ac:chgData name="Sofi Fernández" userId="5dcd86d9bf03d87f" providerId="LiveId" clId="{0D968FC9-45FF-4A34-9D4F-223E4420D3F4}" dt="2023-11-10T12:48:32.550" v="716" actId="1036"/>
-          <ac:cxnSpMkLst>
-            <pc:docMk/>
-            <pc:sldMk cId="1144188503" sldId="296"/>
-            <ac:cxnSpMk id="206" creationId="{3075AB11-BAD3-42E5-BC8F-B1153E21F91C}"/>
-          </ac:cxnSpMkLst>
-        </pc:cxnChg>
-      </pc:sldChg>
-    </pc:docChg>
-  </pc:docChgLst>
 </pc:chgInfo>
 </file>
 
@@ -1356,7 +1356,7 @@
             <a:pPr rtl="0"/>
             <a:fld id="{77664146-FBEF-4E7A-BE7E-88F5A344CB7F}" type="datetime1">
               <a:rPr lang="es-ES" smtClean="0"/>
-              <a:t>10/11/2023</a:t>
+              <a:t>12/11/2023</a:t>
             </a:fld>
             <a:endParaRPr lang="es-ES" dirty="0"/>
           </a:p>
@@ -1537,7 +1537,7 @@
             <a:fld id="{04B0FB2D-5AA9-4F92-8B03-7FC01ECC8A74}" type="datetime1">
               <a:rPr lang="es-ES" smtClean="0"/>
               <a:pPr/>
-              <a:t>10/11/2023</a:t>
+              <a:t>12/11/2023</a:t>
             </a:fld>
             <a:endParaRPr lang="es-ES" dirty="0"/>
           </a:p>
@@ -1934,7 +1934,7 @@
             <a:pPr rtl="0"/>
             <a:fld id="{90D32AF3-2499-49DF-8FCA-91C6AB45321C}" type="datetime1">
               <a:rPr lang="es-ES" noProof="0" smtClean="0"/>
-              <a:t>10/11/2023</a:t>
+              <a:t>12/11/2023</a:t>
             </a:fld>
             <a:endParaRPr lang="es-ES" noProof="0"/>
           </a:p>
@@ -2136,7 +2136,7 @@
             <a:pPr rtl="0"/>
             <a:fld id="{AB0538E1-A5D3-42FF-8CD4-E096C8ACEFDF}" type="datetime1">
               <a:rPr lang="es-ES" noProof="0" smtClean="0"/>
-              <a:t>10/11/2023</a:t>
+              <a:t>12/11/2023</a:t>
             </a:fld>
             <a:endParaRPr lang="es-ES" noProof="0"/>
           </a:p>
@@ -2529,7 +2529,7 @@
             <a:pPr rtl="0"/>
             <a:fld id="{3AC18077-79BA-41FF-924A-51203568CBEB}" type="datetime1">
               <a:rPr lang="es-ES" noProof="0" smtClean="0"/>
-              <a:t>10/11/2023</a:t>
+              <a:t>12/11/2023</a:t>
             </a:fld>
             <a:endParaRPr lang="es-ES" noProof="0"/>
           </a:p>
@@ -7830,8 +7830,8 @@
         </p:nvSpPr>
         <p:spPr>
           <a:xfrm>
-            <a:off x="7521399" y="2557463"/>
-            <a:ext cx="669282" cy="396029"/>
+            <a:off x="7228514" y="2677065"/>
+            <a:ext cx="1183935" cy="284761"/>
           </a:xfrm>
           <a:prstGeom prst="roundRect">
             <a:avLst/>
@@ -7894,7 +7894,7 @@
                 <a:latin typeface="Posterama" panose="020B0504020200020000" pitchFamily="34" charset="0"/>
                 <a:cs typeface="Posterama" panose="020B0504020200020000" pitchFamily="34" charset="0"/>
               </a:rPr>
-              <a:t>V1</a:t>
+              <a:t>Lanzamiento</a:t>
             </a:r>
           </a:p>
         </p:txBody>

</xml_diff>